<commit_message>
Api de Calculo Computacional
</commit_message>
<xml_diff>
--- a/2020_2 Analise de Sistema/Aulas/2020_08_19 Etapas de Aplicação/Ativ(ADS).pptx
+++ b/2020_2 Analise de Sistema/Aulas/2020_08_19 Etapas de Aplicação/Ativ(ADS).pptx
@@ -1085,7 +1085,7 @@
           <a:blip xmlns:r="http://schemas.openxmlformats.org/officeDocument/2006/relationships" r:embed="rId1">
             <a:extLst>
               <a:ext uri="{96DAC541-7B7A-43D3-8B79-37D633B846F1}">
-                <asvg:svgBlip xmlns="" xmlns:asvg="http://schemas.microsoft.com/office/drawing/2016/SVG/main" r:embed="rId2"/>
+                <asvg:svgBlip xmlns:asvg="http://schemas.microsoft.com/office/drawing/2016/SVG/main" xmlns="" r:embed="rId2"/>
               </a:ext>
             </a:extLst>
           </a:blip>
@@ -1138,7 +1138,7 @@
                 <a14:useLocalDpi xmlns:a14="http://schemas.microsoft.com/office/drawing/2010/main" val="0"/>
               </a:ext>
               <a:ext uri="{96DAC541-7B7A-43D3-8B79-37D633B846F1}">
-                <asvg:svgBlip xmlns="" xmlns:asvg="http://schemas.microsoft.com/office/drawing/2016/SVG/main" r:embed="rId4"/>
+                <asvg:svgBlip xmlns:asvg="http://schemas.microsoft.com/office/drawing/2016/SVG/main" xmlns="" r:embed="rId4"/>
               </a:ext>
             </a:extLst>
           </a:blip>
@@ -1195,7 +1195,7 @@
           <a:blip xmlns:r="http://schemas.openxmlformats.org/officeDocument/2006/relationships" r:embed="rId5">
             <a:extLst>
               <a:ext uri="{96DAC541-7B7A-43D3-8B79-37D633B846F1}">
-                <asvg:svgBlip xmlns="" xmlns:asvg="http://schemas.microsoft.com/office/drawing/2016/SVG/main" r:embed="rId6"/>
+                <asvg:svgBlip xmlns:asvg="http://schemas.microsoft.com/office/drawing/2016/SVG/main" xmlns="" r:embed="rId6"/>
               </a:ext>
             </a:extLst>
           </a:blip>
@@ -1245,7 +1245,7 @@
           <a:blip xmlns:r="http://schemas.openxmlformats.org/officeDocument/2006/relationships" r:embed="rId7">
             <a:extLst>
               <a:ext uri="{96DAC541-7B7A-43D3-8B79-37D633B846F1}">
-                <asvg:svgBlip xmlns="" xmlns:asvg="http://schemas.microsoft.com/office/drawing/2016/SVG/main" r:embed="rId8"/>
+                <asvg:svgBlip xmlns:asvg="http://schemas.microsoft.com/office/drawing/2016/SVG/main" xmlns="" r:embed="rId8"/>
               </a:ext>
             </a:extLst>
           </a:blip>
@@ -1346,7 +1346,7 @@
           <a:blip xmlns:r="http://schemas.openxmlformats.org/officeDocument/2006/relationships" r:embed="rId1">
             <a:extLst>
               <a:ext uri="{96DAC541-7B7A-43D3-8B79-37D633B846F1}">
-                <asvg:svgBlip xmlns="" xmlns:asvg="http://schemas.microsoft.com/office/drawing/2016/SVG/main" r:embed="rId2"/>
+                <asvg:svgBlip xmlns:asvg="http://schemas.microsoft.com/office/drawing/2016/SVG/main" xmlns="" r:embed="rId2"/>
               </a:ext>
             </a:extLst>
           </a:blip>
@@ -1461,7 +1461,7 @@
                 <a14:useLocalDpi xmlns:a14="http://schemas.microsoft.com/office/drawing/2010/main" val="0"/>
               </a:ext>
               <a:ext uri="{96DAC541-7B7A-43D3-8B79-37D633B846F1}">
-                <asvg:svgBlip xmlns="" xmlns:asvg="http://schemas.microsoft.com/office/drawing/2016/SVG/main" r:embed="rId4"/>
+                <asvg:svgBlip xmlns:asvg="http://schemas.microsoft.com/office/drawing/2016/SVG/main" xmlns="" r:embed="rId4"/>
               </a:ext>
             </a:extLst>
           </a:blip>
@@ -1573,7 +1573,7 @@
           <a:blip xmlns:r="http://schemas.openxmlformats.org/officeDocument/2006/relationships" r:embed="rId5">
             <a:extLst>
               <a:ext uri="{96DAC541-7B7A-43D3-8B79-37D633B846F1}">
-                <asvg:svgBlip xmlns="" xmlns:asvg="http://schemas.microsoft.com/office/drawing/2016/SVG/main" r:embed="rId6"/>
+                <asvg:svgBlip xmlns:asvg="http://schemas.microsoft.com/office/drawing/2016/SVG/main" xmlns="" r:embed="rId6"/>
               </a:ext>
             </a:extLst>
           </a:blip>
@@ -1685,7 +1685,7 @@
           <a:blip xmlns:r="http://schemas.openxmlformats.org/officeDocument/2006/relationships" r:embed="rId7">
             <a:extLst>
               <a:ext uri="{96DAC541-7B7A-43D3-8B79-37D633B846F1}">
-                <asvg:svgBlip xmlns="" xmlns:asvg="http://schemas.microsoft.com/office/drawing/2016/SVG/main" r:embed="rId8"/>
+                <asvg:svgBlip xmlns:asvg="http://schemas.microsoft.com/office/drawing/2016/SVG/main" xmlns="" r:embed="rId8"/>
               </a:ext>
             </a:extLst>
           </a:blip>
@@ -1962,7 +1962,7 @@
   </dgm:layoutNode>
   <dgm:extLst>
     <a:ext uri="{68A01E43-0DF5-4B5B-8FA6-DAF915123BFB}">
-      <dgm1612:lstStyle xmlns="" xmlns:dgm1612="http://schemas.microsoft.com/office/drawing/2016/12/diagram">
+      <dgm1612:lstStyle xmlns:dgm1612="http://schemas.microsoft.com/office/drawing/2016/12/diagram" xmlns="">
         <a:lvl1pPr>
           <a:lnSpc>
             <a:spcPct val="100000"/>
@@ -3509,7 +3509,7 @@
             <a:fld id="{B61BEF0D-F0BB-DE4B-95CE-6DB70DBA9567}" type="datetimeFigureOut">
               <a:rPr lang="en-US" dirty="0"/>
               <a:pPr/>
-              <a:t>8/31/2020</a:t>
+              <a:t>9/4/2020</a:t>
             </a:fld>
             <a:endParaRPr lang="en-US" dirty="0"/>
           </a:p>
@@ -3802,7 +3802,7 @@
             <a:fld id="{B61BEF0D-F0BB-DE4B-95CE-6DB70DBA9567}" type="datetimeFigureOut">
               <a:rPr lang="en-US" dirty="0"/>
               <a:pPr/>
-              <a:t>8/31/2020</a:t>
+              <a:t>9/4/2020</a:t>
             </a:fld>
             <a:endParaRPr lang="en-US" dirty="0"/>
           </a:p>
@@ -4051,7 +4051,7 @@
             <a:fld id="{B61BEF0D-F0BB-DE4B-95CE-6DB70DBA9567}" type="datetimeFigureOut">
               <a:rPr lang="en-US" dirty="0"/>
               <a:pPr/>
-              <a:t>8/31/2020</a:t>
+              <a:t>9/4/2020</a:t>
             </a:fld>
             <a:endParaRPr lang="en-US" dirty="0"/>
           </a:p>
@@ -4592,7 +4592,7 @@
             <a:fld id="{B61BEF0D-F0BB-DE4B-95CE-6DB70DBA9567}" type="datetimeFigureOut">
               <a:rPr lang="en-US" dirty="0"/>
               <a:pPr/>
-              <a:t>8/31/2020</a:t>
+              <a:t>9/4/2020</a:t>
             </a:fld>
             <a:endParaRPr lang="en-US" dirty="0"/>
           </a:p>
@@ -4841,7 +4841,7 @@
             <a:fld id="{B61BEF0D-F0BB-DE4B-95CE-6DB70DBA9567}" type="datetimeFigureOut">
               <a:rPr lang="en-US" dirty="0"/>
               <a:pPr/>
-              <a:t>8/31/2020</a:t>
+              <a:t>9/4/2020</a:t>
             </a:fld>
             <a:endParaRPr lang="en-US" dirty="0"/>
           </a:p>
@@ -5374,7 +5374,7 @@
             <a:fld id="{B61BEF0D-F0BB-DE4B-95CE-6DB70DBA9567}" type="datetimeFigureOut">
               <a:rPr lang="en-US" dirty="0"/>
               <a:pPr/>
-              <a:t>8/31/2020</a:t>
+              <a:t>9/4/2020</a:t>
             </a:fld>
             <a:endParaRPr lang="en-US" dirty="0"/>
           </a:p>
@@ -5672,7 +5672,7 @@
             <a:fld id="{B61BEF0D-F0BB-DE4B-95CE-6DB70DBA9567}" type="datetimeFigureOut">
               <a:rPr lang="en-US" dirty="0"/>
               <a:pPr/>
-              <a:t>8/31/2020</a:t>
+              <a:t>9/4/2020</a:t>
             </a:fld>
             <a:endParaRPr lang="en-US" dirty="0"/>
           </a:p>
@@ -5846,7 +5846,7 @@
             <a:fld id="{B61BEF0D-F0BB-DE4B-95CE-6DB70DBA9567}" type="datetimeFigureOut">
               <a:rPr lang="en-US" dirty="0"/>
               <a:pPr/>
-              <a:t>8/31/2020</a:t>
+              <a:t>9/4/2020</a:t>
             </a:fld>
             <a:endParaRPr lang="en-US" dirty="0"/>
           </a:p>
@@ -6026,7 +6026,7 @@
             <a:fld id="{B61BEF0D-F0BB-DE4B-95CE-6DB70DBA9567}" type="datetimeFigureOut">
               <a:rPr lang="en-US" dirty="0"/>
               <a:pPr/>
-              <a:t>8/31/2020</a:t>
+              <a:t>9/4/2020</a:t>
             </a:fld>
             <a:endParaRPr lang="en-US" dirty="0"/>
           </a:p>
@@ -6268,7 +6268,7 @@
             <a:fld id="{1D8BD707-D9CF-40AE-B4C6-C98DA3205C09}" type="datetimeFigureOut">
               <a:rPr lang="en-US" smtClean="0"/>
               <a:pPr/>
-              <a:t>8/31/2020</a:t>
+              <a:t>9/4/2020</a:t>
             </a:fld>
             <a:endParaRPr lang="en-US" dirty="0"/>
           </a:p>
@@ -6433,7 +6433,7 @@
             <a:fld id="{1D8BD707-D9CF-40AE-B4C6-C98DA3205C09}" type="datetimeFigureOut">
               <a:rPr lang="en-US" smtClean="0"/>
               <a:pPr/>
-              <a:t>8/31/2020</a:t>
+              <a:t>9/4/2020</a:t>
             </a:fld>
             <a:endParaRPr lang="en-US" dirty="0"/>
           </a:p>
@@ -6598,7 +6598,7 @@
             <a:fld id="{B61BEF0D-F0BB-DE4B-95CE-6DB70DBA9567}" type="datetimeFigureOut">
               <a:rPr lang="en-US" dirty="0"/>
               <a:pPr/>
-              <a:t>8/31/2020</a:t>
+              <a:t>9/4/2020</a:t>
             </a:fld>
             <a:endParaRPr lang="en-US" dirty="0"/>
           </a:p>
@@ -6850,7 +6850,7 @@
             <a:fld id="{1D8BD707-D9CF-40AE-B4C6-C98DA3205C09}" type="datetimeFigureOut">
               <a:rPr lang="en-US" smtClean="0"/>
               <a:pPr/>
-              <a:t>8/31/2020</a:t>
+              <a:t>9/4/2020</a:t>
             </a:fld>
             <a:endParaRPr lang="en-US" dirty="0"/>
           </a:p>
@@ -7132,7 +7132,7 @@
             <a:fld id="{1D8BD707-D9CF-40AE-B4C6-C98DA3205C09}" type="datetimeFigureOut">
               <a:rPr lang="en-US" smtClean="0"/>
               <a:pPr/>
-              <a:t>8/31/2020</a:t>
+              <a:t>9/4/2020</a:t>
             </a:fld>
             <a:endParaRPr lang="en-US" dirty="0"/>
           </a:p>
@@ -7548,7 +7548,7 @@
             <a:fld id="{1D8BD707-D9CF-40AE-B4C6-C98DA3205C09}" type="datetimeFigureOut">
               <a:rPr lang="en-US" smtClean="0"/>
               <a:pPr/>
-              <a:t>8/31/2020</a:t>
+              <a:t>9/4/2020</a:t>
             </a:fld>
             <a:endParaRPr lang="en-US" dirty="0"/>
           </a:p>
@@ -7662,7 +7662,7 @@
             <a:fld id="{1D8BD707-D9CF-40AE-B4C6-C98DA3205C09}" type="datetimeFigureOut">
               <a:rPr lang="en-US" smtClean="0"/>
               <a:pPr/>
-              <a:t>8/31/2020</a:t>
+              <a:t>9/4/2020</a:t>
             </a:fld>
             <a:endParaRPr lang="en-US" dirty="0"/>
           </a:p>
@@ -7754,7 +7754,7 @@
             <a:fld id="{1D8BD707-D9CF-40AE-B4C6-C98DA3205C09}" type="datetimeFigureOut">
               <a:rPr lang="en-US" smtClean="0"/>
               <a:pPr/>
-              <a:t>8/31/2020</a:t>
+              <a:t>9/4/2020</a:t>
             </a:fld>
             <a:endParaRPr lang="en-US" dirty="0"/>
           </a:p>
@@ -8026,7 +8026,7 @@
             <a:fld id="{1D8BD707-D9CF-40AE-B4C6-C98DA3205C09}" type="datetimeFigureOut">
               <a:rPr lang="en-US" smtClean="0"/>
               <a:pPr/>
-              <a:t>8/31/2020</a:t>
+              <a:t>9/4/2020</a:t>
             </a:fld>
             <a:endParaRPr lang="en-US" dirty="0"/>
           </a:p>
@@ -8275,7 +8275,7 @@
             <a:fld id="{1D8BD707-D9CF-40AE-B4C6-C98DA3205C09}" type="datetimeFigureOut">
               <a:rPr lang="en-US" smtClean="0"/>
               <a:pPr/>
-              <a:t>8/31/2020</a:t>
+              <a:t>9/4/2020</a:t>
             </a:fld>
             <a:endParaRPr lang="en-US" dirty="0"/>
           </a:p>
@@ -8440,7 +8440,7 @@
             <a:fld id="{1D8BD707-D9CF-40AE-B4C6-C98DA3205C09}" type="datetimeFigureOut">
               <a:rPr lang="en-US" smtClean="0"/>
               <a:pPr/>
-              <a:t>8/31/2020</a:t>
+              <a:t>9/4/2020</a:t>
             </a:fld>
             <a:endParaRPr lang="en-US" dirty="0"/>
           </a:p>
@@ -8615,7 +8615,7 @@
             <a:fld id="{1D8BD707-D9CF-40AE-B4C6-C98DA3205C09}" type="datetimeFigureOut">
               <a:rPr lang="en-US" smtClean="0"/>
               <a:pPr/>
-              <a:t>8/31/2020</a:t>
+              <a:t>9/4/2020</a:t>
             </a:fld>
             <a:endParaRPr lang="en-US" dirty="0"/>
           </a:p>
@@ -8857,7 +8857,7 @@
             <a:fld id="{B61BEF0D-F0BB-DE4B-95CE-6DB70DBA9567}" type="datetimeFigureOut">
               <a:rPr lang="en-US" dirty="0"/>
               <a:pPr/>
-              <a:t>8/31/2020</a:t>
+              <a:t>9/4/2020</a:t>
             </a:fld>
             <a:endParaRPr lang="en-US" dirty="0"/>
           </a:p>
@@ -9153,7 +9153,7 @@
             <a:fld id="{B61BEF0D-F0BB-DE4B-95CE-6DB70DBA9567}" type="datetimeFigureOut">
               <a:rPr lang="en-US" dirty="0"/>
               <a:pPr/>
-              <a:t>8/31/2020</a:t>
+              <a:t>9/4/2020</a:t>
             </a:fld>
             <a:endParaRPr lang="en-US" dirty="0"/>
           </a:p>
@@ -9594,7 +9594,7 @@
             <a:fld id="{B61BEF0D-F0BB-DE4B-95CE-6DB70DBA9567}" type="datetimeFigureOut">
               <a:rPr lang="en-US" dirty="0"/>
               <a:pPr/>
-              <a:t>8/31/2020</a:t>
+              <a:t>9/4/2020</a:t>
             </a:fld>
             <a:endParaRPr lang="en-US" dirty="0"/>
           </a:p>
@@ -9713,7 +9713,7 @@
             <a:fld id="{B61BEF0D-F0BB-DE4B-95CE-6DB70DBA9567}" type="datetimeFigureOut">
               <a:rPr lang="en-US" dirty="0"/>
               <a:pPr/>
-              <a:t>8/31/2020</a:t>
+              <a:t>9/4/2020</a:t>
             </a:fld>
             <a:endParaRPr lang="en-US" dirty="0"/>
           </a:p>
@@ -9810,7 +9810,7 @@
             <a:fld id="{B61BEF0D-F0BB-DE4B-95CE-6DB70DBA9567}" type="datetimeFigureOut">
               <a:rPr lang="en-US" dirty="0"/>
               <a:pPr/>
-              <a:t>8/31/2020</a:t>
+              <a:t>9/4/2020</a:t>
             </a:fld>
             <a:endParaRPr lang="en-US" dirty="0"/>
           </a:p>
@@ -10093,7 +10093,7 @@
             <a:fld id="{B61BEF0D-F0BB-DE4B-95CE-6DB70DBA9567}" type="datetimeFigureOut">
               <a:rPr lang="en-US" dirty="0"/>
               <a:pPr/>
-              <a:t>8/31/2020</a:t>
+              <a:t>9/4/2020</a:t>
             </a:fld>
             <a:endParaRPr lang="en-US" dirty="0"/>
           </a:p>
@@ -10381,7 +10381,7 @@
             <a:fld id="{B61BEF0D-F0BB-DE4B-95CE-6DB70DBA9567}" type="datetimeFigureOut">
               <a:rPr lang="en-US" dirty="0"/>
               <a:pPr/>
-              <a:t>8/31/2020</a:t>
+              <a:t>9/4/2020</a:t>
             </a:fld>
             <a:endParaRPr lang="en-US" dirty="0"/>
           </a:p>
@@ -10911,7 +10911,7 @@
             <a:fld id="{B61BEF0D-F0BB-DE4B-95CE-6DB70DBA9567}" type="datetimeFigureOut">
               <a:rPr lang="en-US" dirty="0"/>
               <a:pPr/>
-              <a:t>8/31/2020</a:t>
+              <a:t>9/4/2020</a:t>
             </a:fld>
             <a:endParaRPr lang="en-US" dirty="0"/>
           </a:p>
@@ -11577,7 +11577,7 @@
             <a:fld id="{1D8BD707-D9CF-40AE-B4C6-C98DA3205C09}" type="datetimeFigureOut">
               <a:rPr lang="en-US" smtClean="0"/>
               <a:pPr/>
-              <a:t>8/31/2020</a:t>
+              <a:t>9/4/2020</a:t>
             </a:fld>
             <a:endParaRPr lang="en-US" dirty="0"/>
           </a:p>
@@ -11964,7 +11964,7 @@
                 <a16:creationId xmlns:a16="http://schemas.microsoft.com/office/drawing/2014/main" id="{E9D059B6-ADD8-488A-B346-63289E90D13F}"/>
               </a:ext>
               <a:ext uri="{C183D7F6-B498-43B3-948B-1728B52AA6E4}">
-                <adec:decorative xmlns="" xmlns:adec="http://schemas.microsoft.com/office/drawing/2017/decorative" val="1"/>
+                <adec:decorative xmlns:adec="http://schemas.microsoft.com/office/drawing/2017/decorative" xmlns="" val="1"/>
               </a:ext>
             </a:extLst>
           </p:cNvPr>
@@ -11995,7 +11995,7 @@
                   <a16:creationId xmlns:a16="http://schemas.microsoft.com/office/drawing/2014/main" id="{F69B42B4-BC82-4495-A6F9-A28167B56A0E}"/>
                 </a:ext>
                 <a:ext uri="{C183D7F6-B498-43B3-948B-1728B52AA6E4}">
-                  <adec:decorative xmlns="" xmlns:adec="http://schemas.microsoft.com/office/drawing/2017/decorative" val="1"/>
+                  <adec:decorative xmlns:adec="http://schemas.microsoft.com/office/drawing/2017/decorative" xmlns="" val="1"/>
                 </a:ext>
               </a:extLst>
             </p:cNvPr>
@@ -12056,7 +12056,7 @@
                   <a16:creationId xmlns:a16="http://schemas.microsoft.com/office/drawing/2014/main" id="{83CC168C-2AD4-4FFB-9F25-420ED6514C7D}"/>
                 </a:ext>
                 <a:ext uri="{C183D7F6-B498-43B3-948B-1728B52AA6E4}">
-                  <adec:decorative xmlns="" xmlns:adec="http://schemas.microsoft.com/office/drawing/2017/decorative" val="1"/>
+                  <adec:decorative xmlns:adec="http://schemas.microsoft.com/office/drawing/2017/decorative" xmlns="" val="1"/>
                 </a:ext>
               </a:extLst>
             </p:cNvPr>
@@ -12123,7 +12123,7 @@
                   <a16:creationId xmlns:a16="http://schemas.microsoft.com/office/drawing/2014/main" id="{6C9F369A-6158-4AE8-BA04-138A9DFFAE05}"/>
                 </a:ext>
                 <a:ext uri="{C183D7F6-B498-43B3-948B-1728B52AA6E4}">
-                  <adec:decorative xmlns="" xmlns:adec="http://schemas.microsoft.com/office/drawing/2017/decorative" val="1"/>
+                  <adec:decorative xmlns:adec="http://schemas.microsoft.com/office/drawing/2017/decorative" xmlns="" val="1"/>
                 </a:ext>
               </a:extLst>
             </p:cNvPr>
@@ -12184,7 +12184,7 @@
                   <a16:creationId xmlns:a16="http://schemas.microsoft.com/office/drawing/2014/main" id="{FC7B1DF4-AD98-42A8-820F-667A3DCC40AC}"/>
                 </a:ext>
                 <a:ext uri="{C183D7F6-B498-43B3-948B-1728B52AA6E4}">
-                  <adec:decorative xmlns="" xmlns:adec="http://schemas.microsoft.com/office/drawing/2017/decorative" val="1"/>
+                  <adec:decorative xmlns:adec="http://schemas.microsoft.com/office/drawing/2017/decorative" xmlns="" val="1"/>
                 </a:ext>
               </a:extLst>
             </p:cNvPr>
@@ -12244,7 +12244,7 @@
                   <a16:creationId xmlns:a16="http://schemas.microsoft.com/office/drawing/2014/main" id="{61C58B74-3656-4FD5-AC47-EE3A59EBB818}"/>
                 </a:ext>
                 <a:ext uri="{C183D7F6-B498-43B3-948B-1728B52AA6E4}">
-                  <adec:decorative xmlns="" xmlns:adec="http://schemas.microsoft.com/office/drawing/2017/decorative" val="1"/>
+                  <adec:decorative xmlns:adec="http://schemas.microsoft.com/office/drawing/2017/decorative" xmlns="" val="1"/>
                 </a:ext>
               </a:extLst>
             </p:cNvPr>
@@ -12310,7 +12310,7 @@
                   <a16:creationId xmlns:a16="http://schemas.microsoft.com/office/drawing/2014/main" id="{8B349A01-D803-4A18-B608-47BFCED43435}"/>
                 </a:ext>
                 <a:ext uri="{C183D7F6-B498-43B3-948B-1728B52AA6E4}">
-                  <adec:decorative xmlns="" xmlns:adec="http://schemas.microsoft.com/office/drawing/2017/decorative" val="1"/>
+                  <adec:decorative xmlns:adec="http://schemas.microsoft.com/office/drawing/2017/decorative" xmlns="" val="1"/>
                 </a:ext>
               </a:extLst>
             </p:cNvPr>
@@ -12384,7 +12384,7 @@
                 <a16:creationId xmlns:a16="http://schemas.microsoft.com/office/drawing/2014/main" id="{E67A1FC6-22FB-4EA7-B90A-C9F18FBEF30F}"/>
               </a:ext>
               <a:ext uri="{C183D7F6-B498-43B3-948B-1728B52AA6E4}">
-                <adec:decorative xmlns="" xmlns:adec="http://schemas.microsoft.com/office/drawing/2017/decorative" val="1"/>
+                <adec:decorative xmlns:adec="http://schemas.microsoft.com/office/drawing/2017/decorative" xmlns="" val="1"/>
               </a:ext>
             </a:extLst>
           </p:cNvPr>
@@ -12444,7 +12444,7 @@
                 <a16:creationId xmlns:a16="http://schemas.microsoft.com/office/drawing/2014/main" id="{6246FDC4-DD97-431A-914A-9EB57A4A3C7C}"/>
               </a:ext>
               <a:ext uri="{C183D7F6-B498-43B3-948B-1728B52AA6E4}">
-                <adec:decorative xmlns="" xmlns:adec="http://schemas.microsoft.com/office/drawing/2017/decorative" val="1"/>
+                <adec:decorative xmlns:adec="http://schemas.microsoft.com/office/drawing/2017/decorative" xmlns="" val="1"/>
               </a:ext>
             </a:extLst>
           </p:cNvPr>
@@ -12692,7 +12692,7 @@
                 <a16:creationId xmlns:a16="http://schemas.microsoft.com/office/drawing/2014/main" id="{CD4E68A2-74B0-42F5-BB75-2E1A7C2018C7}"/>
               </a:ext>
               <a:ext uri="{C183D7F6-B498-43B3-948B-1728B52AA6E4}">
-                <adec:decorative xmlns="" xmlns:adec="http://schemas.microsoft.com/office/drawing/2017/decorative" val="1"/>
+                <adec:decorative xmlns:adec="http://schemas.microsoft.com/office/drawing/2017/decorative" xmlns="" val="1"/>
               </a:ext>
             </a:extLst>
           </p:cNvPr>
@@ -13189,7 +13189,7 @@
           <a:blip r:embed="rId2">
             <a:extLst>
               <a:ext uri="{96DAC541-7B7A-43D3-8B79-37D633B846F1}">
-                <asvg:svgBlip xmlns="" xmlns:asvg="http://schemas.microsoft.com/office/drawing/2016/SVG/main" r:embed="rId8"/>
+                <asvg:svgBlip xmlns:asvg="http://schemas.microsoft.com/office/drawing/2016/SVG/main" xmlns="" r:embed="rId8"/>
               </a:ext>
             </a:extLst>
           </a:blip>
@@ -13218,7 +13218,7 @@
     <a:overrideClrMapping bg1="dk1" tx1="lt1" bg2="dk2" tx2="lt2" accent1="accent1" accent2="accent2" accent3="accent3" accent4="accent4" accent5="accent5" accent6="accent6" hlink="hlink" folHlink="folHlink"/>
   </p:clrMapOvr>
   <mc:AlternateContent xmlns:mc="http://schemas.openxmlformats.org/markup-compatibility/2006">
-    <mc:Choice xmlns="" xmlns:p159="http://schemas.microsoft.com/office/powerpoint/2015/09/main" Requires="p159">
+    <mc:Choice xmlns:p159="http://schemas.microsoft.com/office/powerpoint/2015/09/main" xmlns="" Requires="p159">
       <p:transition xmlns:p14="http://schemas.microsoft.com/office/powerpoint/2010/main" spd="slow" p14:dur="2000">
         <p159:morph option="byObject"/>
       </p:transition>
@@ -13269,14 +13269,14 @@
           <p:nvPr>
             <p:extLst>
               <p:ext uri="{D42A27DB-BD31-4B8C-83A1-F6EECF244321}">
-                <p14:modId xmlns:p14="http://schemas.microsoft.com/office/powerpoint/2010/main" val="366126427"/>
+                <p14:modId xmlns:p14="http://schemas.microsoft.com/office/powerpoint/2010/main" val="2755471801"/>
               </p:ext>
             </p:extLst>
           </p:nvPr>
         </p:nvGraphicFramePr>
         <p:xfrm>
-          <a:off x="928469" y="1195906"/>
-          <a:ext cx="10536699" cy="5331506"/>
+          <a:off x="928468" y="1195906"/>
+          <a:ext cx="10536698" cy="5331506"/>
         </p:xfrm>
         <a:graphic>
           <a:graphicData uri="http://schemas.openxmlformats.org/drawingml/2006/table">
@@ -13285,38 +13285,31 @@
                 <a:tableStyleId>{5940675A-B579-460E-94D1-54222C63F5DA}</a:tableStyleId>
               </a:tblPr>
               <a:tblGrid>
-                <a:gridCol w="391007">
+                <a:gridCol w="498550">
                   <a:extLst>
                     <a:ext uri="{9D8B030D-6E8A-4147-A177-3AD203B41FA5}">
                       <a16:colId xmlns:a16="http://schemas.microsoft.com/office/drawing/2014/main" val="20000"/>
                     </a:ext>
                   </a:extLst>
                 </a:gridCol>
-                <a:gridCol w="6070998">
+                <a:gridCol w="4325805">
+                  <a:extLst>
+                    <a:ext uri="{9D8B030D-6E8A-4147-A177-3AD203B41FA5}">
+                      <a16:colId xmlns:a16="http://schemas.microsoft.com/office/drawing/2014/main" val="316312984"/>
+                    </a:ext>
+                  </a:extLst>
+                </a:gridCol>
+                <a:gridCol w="4532440">
                   <a:extLst>
                     <a:ext uri="{9D8B030D-6E8A-4147-A177-3AD203B41FA5}">
                       <a16:colId xmlns:a16="http://schemas.microsoft.com/office/drawing/2014/main" val="20001"/>
                     </a:ext>
                   </a:extLst>
                 </a:gridCol>
-                <a:gridCol w="1580427">
+                <a:gridCol w="1179903">
                   <a:extLst>
                     <a:ext uri="{9D8B030D-6E8A-4147-A177-3AD203B41FA5}">
                       <a16:colId xmlns:a16="http://schemas.microsoft.com/office/drawing/2014/main" val="20002"/>
-                    </a:ext>
-                  </a:extLst>
-                </a:gridCol>
-                <a:gridCol w="1379307">
-                  <a:extLst>
-                    <a:ext uri="{9D8B030D-6E8A-4147-A177-3AD203B41FA5}">
-                      <a16:colId xmlns:a16="http://schemas.microsoft.com/office/drawing/2014/main" val="20004"/>
-                    </a:ext>
-                  </a:extLst>
-                </a:gridCol>
-                <a:gridCol w="1114960">
-                  <a:extLst>
-                    <a:ext uri="{9D8B030D-6E8A-4147-A177-3AD203B41FA5}">
-                      <a16:colId xmlns:a16="http://schemas.microsoft.com/office/drawing/2014/main" val="20005"/>
                     </a:ext>
                   </a:extLst>
                 </a:gridCol>
@@ -13388,7 +13381,91 @@
                     <a:p>
                       <a:pPr algn="ctr" fontAlgn="b"/>
                       <a:r>
-                        <a:rPr lang="pt-BR" sz="2000" u="none" strike="noStrike" dirty="0">
+                        <a:rPr lang="pt-BR" sz="2000" b="0" i="0" u="none" strike="noStrike" dirty="0" smtClean="0">
+                          <a:solidFill>
+                            <a:srgbClr val="F94335"/>
+                          </a:solidFill>
+                          <a:latin typeface="Bahnschrift SemiBold SemiConden" panose="020B0502040204020203" pitchFamily="34" charset="0"/>
+                          <a:cs typeface="Arial" pitchFamily="34" charset="0"/>
+                        </a:rPr>
+                        <a:t>Nome</a:t>
+                      </a:r>
+                      <a:endParaRPr lang="pt-BR" sz="2000" b="0" i="0" u="none" strike="noStrike" dirty="0">
+                        <a:solidFill>
+                          <a:srgbClr val="F94335"/>
+                        </a:solidFill>
+                        <a:latin typeface="Bahnschrift SemiBold SemiConden" panose="020B0502040204020203" pitchFamily="34" charset="0"/>
+                        <a:cs typeface="Arial" pitchFamily="34" charset="0"/>
+                      </a:endParaRPr>
+                    </a:p>
+                  </a:txBody>
+                  <a:tcPr marL="5795" marR="5795" marT="5795" marB="27814" anchor="ctr">
+                    <a:lnL w="12700" cap="flat" cmpd="sng" algn="ctr">
+                      <a:solidFill>
+                        <a:schemeClr val="bg1"/>
+                      </a:solidFill>
+                      <a:prstDash val="solid"/>
+                      <a:round/>
+                      <a:headEnd type="none" w="med" len="med"/>
+                      <a:tailEnd type="none" w="med" len="med"/>
+                    </a:lnL>
+                    <a:lnR w="12700" cap="flat" cmpd="sng" algn="ctr">
+                      <a:solidFill>
+                        <a:schemeClr val="bg1"/>
+                      </a:solidFill>
+                      <a:prstDash val="solid"/>
+                      <a:round/>
+                      <a:headEnd type="none" w="med" len="med"/>
+                      <a:tailEnd type="none" w="med" len="med"/>
+                    </a:lnR>
+                    <a:lnT w="12700" cmpd="sng">
+                      <a:noFill/>
+                    </a:lnT>
+                    <a:lnB w="12700" cap="flat" cmpd="sng" algn="ctr">
+                      <a:solidFill>
+                        <a:schemeClr val="bg1"/>
+                      </a:solidFill>
+                      <a:prstDash val="solid"/>
+                      <a:round/>
+                      <a:headEnd type="none" w="med" len="med"/>
+                      <a:tailEnd type="none" w="med" len="med"/>
+                    </a:lnB>
+                    <a:lnTlToBr w="12700" cmpd="sng">
+                      <a:noFill/>
+                      <a:prstDash val="solid"/>
+                    </a:lnTlToBr>
+                    <a:lnBlToTr w="12700" cmpd="sng">
+                      <a:noFill/>
+                      <a:prstDash val="solid"/>
+                    </a:lnBlToTr>
+                  </a:tcPr>
+                </a:tc>
+                <a:tc>
+                  <a:txBody>
+                    <a:bodyPr/>
+                    <a:lstStyle/>
+                    <a:p>
+                      <a:pPr algn="ctr" fontAlgn="b"/>
+                      <a:r>
+                        <a:rPr lang="pt-BR" sz="2000" u="none" strike="noStrike" dirty="0" smtClean="0">
+                          <a:solidFill>
+                            <a:srgbClr val="F94335"/>
+                          </a:solidFill>
+                          <a:latin typeface="Bahnschrift SemiBold SemiConden" panose="020B0502040204020203" pitchFamily="34" charset="0"/>
+                        </a:rPr>
+                        <a:t>Descrição</a:t>
+                      </a:r>
+                      <a:r>
+                        <a:rPr lang="pt-BR" sz="2000" u="none" strike="noStrike" baseline="0" dirty="0" smtClean="0">
+                          <a:solidFill>
+                            <a:srgbClr val="F94335"/>
+                          </a:solidFill>
+                          <a:latin typeface="Bahnschrift SemiBold SemiConden" panose="020B0502040204020203" pitchFamily="34" charset="0"/>
+                        </a:rPr>
+                        <a:t> do </a:t>
+                      </a:r>
+                      <a:r>
+                        <a:rPr lang="pt-BR" sz="2000" u="none" strike="noStrike" dirty="0" smtClean="0">
                           <a:solidFill>
                             <a:srgbClr val="F94335"/>
                           </a:solidFill>
@@ -13462,7 +13539,7 @@
                         <a:t>  </a:t>
                       </a:r>
                       <a:r>
-                        <a:rPr lang="pt-BR" sz="2000" u="none" strike="noStrike" dirty="0">
+                        <a:rPr lang="pt-BR" sz="1600" u="none" strike="noStrike" dirty="0">
                           <a:solidFill>
                             <a:srgbClr val="F94335"/>
                           </a:solidFill>
@@ -13470,197 +13547,7 @@
                         </a:rPr>
                         <a:t>Classificação</a:t>
                       </a:r>
-                      <a:endParaRPr lang="pt-BR" sz="2000" b="0" i="0" u="none" strike="noStrike" dirty="0">
-                        <a:solidFill>
-                          <a:srgbClr val="F94335"/>
-                        </a:solidFill>
-                        <a:latin typeface="Bahnschrift SemiBold SemiConden" panose="020B0502040204020203" pitchFamily="34" charset="0"/>
-                        <a:cs typeface="Arial" pitchFamily="34" charset="0"/>
-                      </a:endParaRPr>
-                    </a:p>
-                  </a:txBody>
-                  <a:tcPr marL="5795" marR="5795" marT="5795" marB="27814" anchor="ctr">
-                    <a:lnL w="12700" cap="flat" cmpd="sng" algn="ctr">
-                      <a:solidFill>
-                        <a:schemeClr val="bg1"/>
-                      </a:solidFill>
-                      <a:prstDash val="solid"/>
-                      <a:round/>
-                      <a:headEnd type="none" w="med" len="med"/>
-                      <a:tailEnd type="none" w="med" len="med"/>
-                    </a:lnL>
-                    <a:lnR w="12700" cap="flat" cmpd="sng" algn="ctr">
-                      <a:solidFill>
-                        <a:schemeClr val="bg1"/>
-                      </a:solidFill>
-                      <a:prstDash val="solid"/>
-                      <a:round/>
-                      <a:headEnd type="none" w="med" len="med"/>
-                      <a:tailEnd type="none" w="med" len="med"/>
-                    </a:lnR>
-                    <a:lnT w="12700" cmpd="sng">
-                      <a:noFill/>
-                    </a:lnT>
-                    <a:lnB w="12700" cap="flat" cmpd="sng" algn="ctr">
-                      <a:solidFill>
-                        <a:schemeClr val="bg1"/>
-                      </a:solidFill>
-                      <a:prstDash val="solid"/>
-                      <a:round/>
-                      <a:headEnd type="none" w="med" len="med"/>
-                      <a:tailEnd type="none" w="med" len="med"/>
-                    </a:lnB>
-                    <a:lnTlToBr w="12700" cmpd="sng">
-                      <a:noFill/>
-                      <a:prstDash val="solid"/>
-                    </a:lnTlToBr>
-                    <a:lnBlToTr w="12700" cmpd="sng">
-                      <a:noFill/>
-                      <a:prstDash val="solid"/>
-                    </a:lnBlToTr>
-                  </a:tcPr>
-                </a:tc>
-                <a:tc>
-                  <a:txBody>
-                    <a:bodyPr/>
-                    <a:lstStyle/>
-                    <a:p>
-                      <a:pPr algn="ctr" fontAlgn="b"/>
-                      <a:r>
-                        <a:rPr lang="pt-BR" sz="2000" u="none" strike="noStrike" dirty="0">
-                          <a:solidFill>
-                            <a:srgbClr val="F94335"/>
-                          </a:solidFill>
-                          <a:latin typeface="Bahnschrift SemiBold SemiConden" panose="020B0502040204020203" pitchFamily="34" charset="0"/>
-                        </a:rPr>
-                        <a:t>     Tamanho</a:t>
-                      </a:r>
-                    </a:p>
-                    <a:p>
-                      <a:pPr algn="ctr" fontAlgn="b"/>
-                      <a:r>
-                        <a:rPr lang="pt-BR" sz="2000" u="none" strike="noStrike" dirty="0">
-                          <a:solidFill>
-                            <a:srgbClr val="F94335"/>
-                          </a:solidFill>
-                          <a:latin typeface="Bahnschrift SemiBold SemiConden" panose="020B0502040204020203" pitchFamily="34" charset="0"/>
-                        </a:rPr>
-                        <a:t>/</a:t>
-                      </a:r>
-                    </a:p>
-                    <a:p>
-                      <a:pPr algn="ctr" fontAlgn="b"/>
-                      <a:r>
-                        <a:rPr lang="pt-BR" sz="2000" u="none" strike="noStrike" dirty="0">
-                          <a:solidFill>
-                            <a:srgbClr val="F94335"/>
-                          </a:solidFill>
-                          <a:latin typeface="Bahnschrift SemiBold SemiConden" panose="020B0502040204020203" pitchFamily="34" charset="0"/>
-                        </a:rPr>
-                        <a:t>Dificuldade</a:t>
-                      </a:r>
-                      <a:endParaRPr lang="pt-BR" sz="2000" b="0" i="0" u="none" strike="noStrike" dirty="0">
-                        <a:solidFill>
-                          <a:srgbClr val="F94335"/>
-                        </a:solidFill>
-                        <a:latin typeface="Bahnschrift SemiBold SemiConden" panose="020B0502040204020203" pitchFamily="34" charset="0"/>
-                        <a:cs typeface="Arial" pitchFamily="34" charset="0"/>
-                      </a:endParaRPr>
-                    </a:p>
-                  </a:txBody>
-                  <a:tcPr marL="5795" marR="5795" marT="5795" marB="27814" anchor="ctr">
-                    <a:lnL w="12700" cap="flat" cmpd="sng" algn="ctr">
-                      <a:solidFill>
-                        <a:schemeClr val="bg1"/>
-                      </a:solidFill>
-                      <a:prstDash val="solid"/>
-                      <a:round/>
-                      <a:headEnd type="none" w="med" len="med"/>
-                      <a:tailEnd type="none" w="med" len="med"/>
-                    </a:lnL>
-                    <a:lnR w="12700" cap="flat" cmpd="sng" algn="ctr">
-                      <a:solidFill>
-                        <a:schemeClr val="bg1"/>
-                      </a:solidFill>
-                      <a:prstDash val="solid"/>
-                      <a:round/>
-                      <a:headEnd type="none" w="med" len="med"/>
-                      <a:tailEnd type="none" w="med" len="med"/>
-                    </a:lnR>
-                    <a:lnT w="12700" cmpd="sng">
-                      <a:noFill/>
-                    </a:lnT>
-                    <a:lnB w="12700" cap="flat" cmpd="sng" algn="ctr">
-                      <a:solidFill>
-                        <a:schemeClr val="bg1"/>
-                      </a:solidFill>
-                      <a:prstDash val="solid"/>
-                      <a:round/>
-                      <a:headEnd type="none" w="med" len="med"/>
-                      <a:tailEnd type="none" w="med" len="med"/>
-                    </a:lnB>
-                    <a:lnTlToBr w="12700" cmpd="sng">
-                      <a:noFill/>
-                      <a:prstDash val="solid"/>
-                    </a:lnTlToBr>
-                    <a:lnBlToTr w="12700" cmpd="sng">
-                      <a:noFill/>
-                      <a:prstDash val="solid"/>
-                    </a:lnBlToTr>
-                  </a:tcPr>
-                </a:tc>
-                <a:tc>
-                  <a:txBody>
-                    <a:bodyPr/>
-                    <a:lstStyle/>
-                    <a:p>
-                      <a:pPr algn="ctr" fontAlgn="b"/>
-                      <a:r>
-                        <a:rPr lang="pt-BR" sz="2000" u="none" strike="noStrike" dirty="0">
-                          <a:solidFill>
-                            <a:srgbClr val="F94335"/>
-                          </a:solidFill>
-                          <a:latin typeface="Bahnschrift SemiBold SemiConden" panose="020B0502040204020203" pitchFamily="34" charset="0"/>
-                        </a:rPr>
-                        <a:t>Ordem</a:t>
-                      </a:r>
-                      <a:r>
-                        <a:rPr lang="pt-BR" sz="2000" u="none" strike="noStrike" baseline="0" dirty="0">
-                          <a:solidFill>
-                            <a:srgbClr val="F94335"/>
-                          </a:solidFill>
-                          <a:latin typeface="Bahnschrift SemiBold SemiConden" panose="020B0502040204020203" pitchFamily="34" charset="0"/>
-                        </a:rPr>
-                        <a:t> </a:t>
-                      </a:r>
-                      <a:r>
-                        <a:rPr lang="pt-BR" sz="2000" u="none" strike="noStrike" dirty="0">
-                          <a:solidFill>
-                            <a:srgbClr val="F94335"/>
-                          </a:solidFill>
-                          <a:latin typeface="Bahnschrift SemiBold SemiConden" panose="020B0502040204020203" pitchFamily="34" charset="0"/>
-                        </a:rPr>
-                        <a:t>de</a:t>
-                      </a:r>
-                      <a:r>
-                        <a:rPr lang="pt-BR" sz="2000" u="none" strike="noStrike" baseline="0" dirty="0">
-                          <a:solidFill>
-                            <a:srgbClr val="F94335"/>
-                          </a:solidFill>
-                          <a:latin typeface="Bahnschrift SemiBold SemiConden" panose="020B0502040204020203" pitchFamily="34" charset="0"/>
-                        </a:rPr>
-                        <a:t> </a:t>
-                      </a:r>
-                      <a:r>
-                        <a:rPr lang="pt-BR" sz="2000" u="none" strike="noStrike" dirty="0">
-                          <a:solidFill>
-                            <a:srgbClr val="F94335"/>
-                          </a:solidFill>
-                          <a:latin typeface="Bahnschrift SemiBold SemiConden" panose="020B0502040204020203" pitchFamily="34" charset="0"/>
-                        </a:rPr>
-                        <a:t>execução</a:t>
-                      </a:r>
-                      <a:endParaRPr lang="pt-BR" sz="2000" b="0" i="0" u="none" strike="noStrike" dirty="0">
+                      <a:endParaRPr lang="pt-BR" sz="1600" b="0" i="0" u="none" strike="noStrike" dirty="0">
                         <a:solidFill>
                           <a:srgbClr val="F94335"/>
                         </a:solidFill>
@@ -13744,6 +13631,68 @@
                   <a:tcPr marL="5795" marR="5795" marT="5795" marB="27814" anchor="b">
                     <a:lnL w="12700" cmpd="sng">
                       <a:noFill/>
+                    </a:lnL>
+                    <a:lnR w="12700" cap="flat" cmpd="sng" algn="ctr">
+                      <a:solidFill>
+                        <a:schemeClr val="bg1"/>
+                      </a:solidFill>
+                      <a:prstDash val="solid"/>
+                      <a:round/>
+                      <a:headEnd type="none" w="med" len="med"/>
+                      <a:tailEnd type="none" w="med" len="med"/>
+                    </a:lnR>
+                    <a:lnT w="12700" cap="flat" cmpd="sng" algn="ctr">
+                      <a:solidFill>
+                        <a:schemeClr val="bg1"/>
+                      </a:solidFill>
+                      <a:prstDash val="solid"/>
+                      <a:round/>
+                      <a:headEnd type="none" w="med" len="med"/>
+                      <a:tailEnd type="none" w="med" len="med"/>
+                    </a:lnT>
+                    <a:lnB w="12700" cap="flat" cmpd="sng" algn="ctr">
+                      <a:solidFill>
+                        <a:schemeClr val="bg1"/>
+                      </a:solidFill>
+                      <a:prstDash val="solid"/>
+                      <a:round/>
+                      <a:headEnd type="none" w="med" len="med"/>
+                      <a:tailEnd type="none" w="med" len="med"/>
+                    </a:lnB>
+                    <a:lnTlToBr w="12700" cmpd="sng">
+                      <a:noFill/>
+                      <a:prstDash val="solid"/>
+                    </a:lnTlToBr>
+                    <a:lnBlToTr w="12700" cmpd="sng">
+                      <a:noFill/>
+                      <a:prstDash val="solid"/>
+                    </a:lnBlToTr>
+                  </a:tcPr>
+                </a:tc>
+                <a:tc>
+                  <a:txBody>
+                    <a:bodyPr/>
+                    <a:lstStyle/>
+                    <a:p>
+                      <a:pPr algn="ctr" fontAlgn="b"/>
+                      <a:endParaRPr lang="pt-BR" sz="1100" b="0" i="0" u="none" strike="noStrike" dirty="0">
+                        <a:solidFill>
+                          <a:srgbClr val="F94335"/>
+                        </a:solidFill>
+                        <a:latin typeface="Bahnschrift SemiBold SemiConden" panose="020B0502040204020203" pitchFamily="34" charset="0"/>
+                        <a:cs typeface="Arial" pitchFamily="34" charset="0"/>
+                      </a:endParaRPr>
+                    </a:p>
+                  </a:txBody>
+                  <a:tcPr marL="5795" marR="5795" marT="5795" marB="27814" anchor="b">
+                    <a:lnL w="12700" cap="flat" cmpd="sng" algn="ctr">
+                      <a:solidFill>
+                        <a:schemeClr val="bg1"/>
+                      </a:solidFill>
+                      <a:prstDash val="solid"/>
+                      <a:round/>
+                      <a:headEnd type="none" w="med" len="med"/>
+                      <a:tailEnd type="none" w="med" len="med"/>
                     </a:lnL>
                     <a:lnR w="12700" cap="flat" cmpd="sng" algn="ctr">
                       <a:solidFill>
@@ -13935,139 +13884,6 @@
                     </a:lnBlToTr>
                   </a:tcPr>
                 </a:tc>
-                <a:tc>
-                  <a:txBody>
-                    <a:bodyPr/>
-                    <a:lstStyle/>
-                    <a:p>
-                      <a:pPr algn="ctr" fontAlgn="b"/>
-                      <a:r>
-                        <a:rPr lang="pt-BR" sz="1100" u="none" strike="noStrike" dirty="0">
-                          <a:solidFill>
-                            <a:srgbClr val="F94335"/>
-                          </a:solidFill>
-                          <a:latin typeface="Bahnschrift SemiBold SemiConden" panose="020B0502040204020203" pitchFamily="34" charset="0"/>
-                        </a:rPr>
-                        <a:t>8</a:t>
-                      </a:r>
-                      <a:endParaRPr lang="pt-BR" sz="1100" b="0" i="0" u="none" strike="noStrike" dirty="0">
-                        <a:solidFill>
-                          <a:srgbClr val="F94335"/>
-                        </a:solidFill>
-                        <a:latin typeface="Bahnschrift SemiBold SemiConden" panose="020B0502040204020203" pitchFamily="34" charset="0"/>
-                        <a:cs typeface="Arial" pitchFamily="34" charset="0"/>
-                      </a:endParaRPr>
-                    </a:p>
-                  </a:txBody>
-                  <a:tcPr marL="5795" marR="5795" marT="5795" marB="27814" anchor="b">
-                    <a:lnL w="12700" cap="flat" cmpd="sng" algn="ctr">
-                      <a:solidFill>
-                        <a:schemeClr val="bg1"/>
-                      </a:solidFill>
-                      <a:prstDash val="solid"/>
-                      <a:round/>
-                      <a:headEnd type="none" w="med" len="med"/>
-                      <a:tailEnd type="none" w="med" len="med"/>
-                    </a:lnL>
-                    <a:lnR w="12700" cap="flat" cmpd="sng" algn="ctr">
-                      <a:solidFill>
-                        <a:schemeClr val="bg1"/>
-                      </a:solidFill>
-                      <a:prstDash val="solid"/>
-                      <a:round/>
-                      <a:headEnd type="none" w="med" len="med"/>
-                      <a:tailEnd type="none" w="med" len="med"/>
-                    </a:lnR>
-                    <a:lnT w="12700" cap="flat" cmpd="sng" algn="ctr">
-                      <a:solidFill>
-                        <a:schemeClr val="bg1"/>
-                      </a:solidFill>
-                      <a:prstDash val="solid"/>
-                      <a:round/>
-                      <a:headEnd type="none" w="med" len="med"/>
-                      <a:tailEnd type="none" w="med" len="med"/>
-                    </a:lnT>
-                    <a:lnB w="12700" cap="flat" cmpd="sng" algn="ctr">
-                      <a:solidFill>
-                        <a:schemeClr val="bg1"/>
-                      </a:solidFill>
-                      <a:prstDash val="solid"/>
-                      <a:round/>
-                      <a:headEnd type="none" w="med" len="med"/>
-                      <a:tailEnd type="none" w="med" len="med"/>
-                    </a:lnB>
-                    <a:lnTlToBr w="12700" cmpd="sng">
-                      <a:noFill/>
-                      <a:prstDash val="solid"/>
-                    </a:lnTlToBr>
-                    <a:lnBlToTr w="12700" cmpd="sng">
-                      <a:noFill/>
-                      <a:prstDash val="solid"/>
-                    </a:lnBlToTr>
-                  </a:tcPr>
-                </a:tc>
-                <a:tc>
-                  <a:txBody>
-                    <a:bodyPr/>
-                    <a:lstStyle/>
-                    <a:p>
-                      <a:pPr algn="ctr" fontAlgn="b"/>
-                      <a:endParaRPr lang="pt-BR" sz="1100" b="0" i="0" u="none" strike="noStrike" dirty="0">
-                        <a:solidFill>
-                          <a:srgbClr val="F94335"/>
-                        </a:solidFill>
-                        <a:latin typeface="Bahnschrift SemiBold SemiConden" panose="020B0502040204020203" pitchFamily="34" charset="0"/>
-                        <a:cs typeface="Arial" pitchFamily="34" charset="0"/>
-                      </a:endParaRPr>
-                    </a:p>
-                  </a:txBody>
-                  <a:tcPr marL="5795" marR="5795" marT="5795" marB="27814" anchor="b">
-                    <a:lnL w="12700" cap="flat" cmpd="sng" algn="ctr">
-                      <a:solidFill>
-                        <a:schemeClr val="bg1"/>
-                      </a:solidFill>
-                      <a:prstDash val="solid"/>
-                      <a:round/>
-                      <a:headEnd type="none" w="med" len="med"/>
-                      <a:tailEnd type="none" w="med" len="med"/>
-                    </a:lnL>
-                    <a:lnR w="12700" cap="flat" cmpd="sng" algn="ctr">
-                      <a:solidFill>
-                        <a:schemeClr val="bg1"/>
-                      </a:solidFill>
-                      <a:prstDash val="solid"/>
-                      <a:round/>
-                      <a:headEnd type="none" w="med" len="med"/>
-                      <a:tailEnd type="none" w="med" len="med"/>
-                    </a:lnR>
-                    <a:lnT w="12700" cap="flat" cmpd="sng" algn="ctr">
-                      <a:solidFill>
-                        <a:schemeClr val="bg1"/>
-                      </a:solidFill>
-                      <a:prstDash val="solid"/>
-                      <a:round/>
-                      <a:headEnd type="none" w="med" len="med"/>
-                      <a:tailEnd type="none" w="med" len="med"/>
-                    </a:lnT>
-                    <a:lnB w="12700" cap="flat" cmpd="sng" algn="ctr">
-                      <a:solidFill>
-                        <a:schemeClr val="bg1"/>
-                      </a:solidFill>
-                      <a:prstDash val="solid"/>
-                      <a:round/>
-                      <a:headEnd type="none" w="med" len="med"/>
-                      <a:tailEnd type="none" w="med" len="med"/>
-                    </a:lnB>
-                    <a:lnTlToBr w="12700" cmpd="sng">
-                      <a:noFill/>
-                      <a:prstDash val="solid"/>
-                    </a:lnTlToBr>
-                    <a:lnBlToTr w="12700" cmpd="sng">
-                      <a:noFill/>
-                      <a:prstDash val="solid"/>
-                    </a:lnBlToTr>
-                  </a:tcPr>
-                </a:tc>
                 <a:extLst>
                   <a:ext uri="{0D108BD9-81ED-4DB2-BD59-A6C34878D82A}">
                     <a16:rowId xmlns:a16="http://schemas.microsoft.com/office/drawing/2014/main" val="10001"/>
@@ -14102,6 +13918,68 @@
                   <a:tcPr marL="5795" marR="5795" marT="5795" marB="27814" anchor="b">
                     <a:lnL w="12700" cmpd="sng">
                       <a:noFill/>
+                    </a:lnL>
+                    <a:lnR w="12700" cap="flat" cmpd="sng" algn="ctr">
+                      <a:solidFill>
+                        <a:schemeClr val="bg1"/>
+                      </a:solidFill>
+                      <a:prstDash val="solid"/>
+                      <a:round/>
+                      <a:headEnd type="none" w="med" len="med"/>
+                      <a:tailEnd type="none" w="med" len="med"/>
+                    </a:lnR>
+                    <a:lnT w="12700" cap="flat" cmpd="sng" algn="ctr">
+                      <a:solidFill>
+                        <a:schemeClr val="bg1"/>
+                      </a:solidFill>
+                      <a:prstDash val="solid"/>
+                      <a:round/>
+                      <a:headEnd type="none" w="med" len="med"/>
+                      <a:tailEnd type="none" w="med" len="med"/>
+                    </a:lnT>
+                    <a:lnB w="12700" cap="flat" cmpd="sng" algn="ctr">
+                      <a:solidFill>
+                        <a:schemeClr val="bg1"/>
+                      </a:solidFill>
+                      <a:prstDash val="solid"/>
+                      <a:round/>
+                      <a:headEnd type="none" w="med" len="med"/>
+                      <a:tailEnd type="none" w="med" len="med"/>
+                    </a:lnB>
+                    <a:lnTlToBr w="12700" cmpd="sng">
+                      <a:noFill/>
+                      <a:prstDash val="solid"/>
+                    </a:lnTlToBr>
+                    <a:lnBlToTr w="12700" cmpd="sng">
+                      <a:noFill/>
+                      <a:prstDash val="solid"/>
+                    </a:lnBlToTr>
+                  </a:tcPr>
+                </a:tc>
+                <a:tc>
+                  <a:txBody>
+                    <a:bodyPr/>
+                    <a:lstStyle/>
+                    <a:p>
+                      <a:pPr algn="ctr" fontAlgn="b"/>
+                      <a:endParaRPr lang="pt-BR" sz="1100" b="0" i="0" u="none" strike="noStrike" dirty="0">
+                        <a:solidFill>
+                          <a:srgbClr val="F94335"/>
+                        </a:solidFill>
+                        <a:latin typeface="Bahnschrift SemiBold SemiConden" panose="020B0502040204020203" pitchFamily="34" charset="0"/>
+                        <a:cs typeface="Arial" pitchFamily="34" charset="0"/>
+                      </a:endParaRPr>
+                    </a:p>
+                  </a:txBody>
+                  <a:tcPr marL="5795" marR="5795" marT="5795" marB="27814" anchor="b">
+                    <a:lnL w="12700" cap="flat" cmpd="sng" algn="ctr">
+                      <a:solidFill>
+                        <a:schemeClr val="bg1"/>
+                      </a:solidFill>
+                      <a:prstDash val="solid"/>
+                      <a:round/>
+                      <a:headEnd type="none" w="med" len="med"/>
+                      <a:tailEnd type="none" w="med" len="med"/>
                     </a:lnL>
                     <a:lnR w="12700" cap="flat" cmpd="sng" algn="ctr">
                       <a:solidFill>
@@ -14293,139 +14171,6 @@
                     </a:lnBlToTr>
                   </a:tcPr>
                 </a:tc>
-                <a:tc>
-                  <a:txBody>
-                    <a:bodyPr/>
-                    <a:lstStyle/>
-                    <a:p>
-                      <a:pPr algn="ctr" fontAlgn="b"/>
-                      <a:r>
-                        <a:rPr lang="pt-BR" sz="1100" u="none" strike="noStrike" dirty="0">
-                          <a:solidFill>
-                            <a:srgbClr val="F94335"/>
-                          </a:solidFill>
-                          <a:latin typeface="Bahnschrift SemiBold SemiConden" panose="020B0502040204020203" pitchFamily="34" charset="0"/>
-                        </a:rPr>
-                        <a:t>5</a:t>
-                      </a:r>
-                      <a:endParaRPr lang="pt-BR" sz="1100" b="0" i="0" u="none" strike="noStrike" dirty="0">
-                        <a:solidFill>
-                          <a:srgbClr val="F94335"/>
-                        </a:solidFill>
-                        <a:latin typeface="Bahnschrift SemiBold SemiConden" panose="020B0502040204020203" pitchFamily="34" charset="0"/>
-                        <a:cs typeface="Arial" pitchFamily="34" charset="0"/>
-                      </a:endParaRPr>
-                    </a:p>
-                  </a:txBody>
-                  <a:tcPr marL="5795" marR="5795" marT="5795" marB="27814" anchor="b">
-                    <a:lnL w="12700" cap="flat" cmpd="sng" algn="ctr">
-                      <a:solidFill>
-                        <a:schemeClr val="bg1"/>
-                      </a:solidFill>
-                      <a:prstDash val="solid"/>
-                      <a:round/>
-                      <a:headEnd type="none" w="med" len="med"/>
-                      <a:tailEnd type="none" w="med" len="med"/>
-                    </a:lnL>
-                    <a:lnR w="12700" cap="flat" cmpd="sng" algn="ctr">
-                      <a:solidFill>
-                        <a:schemeClr val="bg1"/>
-                      </a:solidFill>
-                      <a:prstDash val="solid"/>
-                      <a:round/>
-                      <a:headEnd type="none" w="med" len="med"/>
-                      <a:tailEnd type="none" w="med" len="med"/>
-                    </a:lnR>
-                    <a:lnT w="12700" cap="flat" cmpd="sng" algn="ctr">
-                      <a:solidFill>
-                        <a:schemeClr val="bg1"/>
-                      </a:solidFill>
-                      <a:prstDash val="solid"/>
-                      <a:round/>
-                      <a:headEnd type="none" w="med" len="med"/>
-                      <a:tailEnd type="none" w="med" len="med"/>
-                    </a:lnT>
-                    <a:lnB w="12700" cap="flat" cmpd="sng" algn="ctr">
-                      <a:solidFill>
-                        <a:schemeClr val="bg1"/>
-                      </a:solidFill>
-                      <a:prstDash val="solid"/>
-                      <a:round/>
-                      <a:headEnd type="none" w="med" len="med"/>
-                      <a:tailEnd type="none" w="med" len="med"/>
-                    </a:lnB>
-                    <a:lnTlToBr w="12700" cmpd="sng">
-                      <a:noFill/>
-                      <a:prstDash val="solid"/>
-                    </a:lnTlToBr>
-                    <a:lnBlToTr w="12700" cmpd="sng">
-                      <a:noFill/>
-                      <a:prstDash val="solid"/>
-                    </a:lnBlToTr>
-                  </a:tcPr>
-                </a:tc>
-                <a:tc>
-                  <a:txBody>
-                    <a:bodyPr/>
-                    <a:lstStyle/>
-                    <a:p>
-                      <a:pPr algn="ctr" fontAlgn="b"/>
-                      <a:endParaRPr lang="pt-BR" sz="1100" b="0" i="0" u="none" strike="noStrike" dirty="0">
-                        <a:solidFill>
-                          <a:srgbClr val="F94335"/>
-                        </a:solidFill>
-                        <a:latin typeface="Bahnschrift SemiBold SemiConden" panose="020B0502040204020203" pitchFamily="34" charset="0"/>
-                        <a:cs typeface="Arial" pitchFamily="34" charset="0"/>
-                      </a:endParaRPr>
-                    </a:p>
-                  </a:txBody>
-                  <a:tcPr marL="5795" marR="5795" marT="5795" marB="27814" anchor="b">
-                    <a:lnL w="12700" cap="flat" cmpd="sng" algn="ctr">
-                      <a:solidFill>
-                        <a:schemeClr val="bg1"/>
-                      </a:solidFill>
-                      <a:prstDash val="solid"/>
-                      <a:round/>
-                      <a:headEnd type="none" w="med" len="med"/>
-                      <a:tailEnd type="none" w="med" len="med"/>
-                    </a:lnL>
-                    <a:lnR w="12700" cap="flat" cmpd="sng" algn="ctr">
-                      <a:solidFill>
-                        <a:schemeClr val="bg1"/>
-                      </a:solidFill>
-                      <a:prstDash val="solid"/>
-                      <a:round/>
-                      <a:headEnd type="none" w="med" len="med"/>
-                      <a:tailEnd type="none" w="med" len="med"/>
-                    </a:lnR>
-                    <a:lnT w="12700" cap="flat" cmpd="sng" algn="ctr">
-                      <a:solidFill>
-                        <a:schemeClr val="bg1"/>
-                      </a:solidFill>
-                      <a:prstDash val="solid"/>
-                      <a:round/>
-                      <a:headEnd type="none" w="med" len="med"/>
-                      <a:tailEnd type="none" w="med" len="med"/>
-                    </a:lnT>
-                    <a:lnB w="12700" cap="flat" cmpd="sng" algn="ctr">
-                      <a:solidFill>
-                        <a:schemeClr val="bg1"/>
-                      </a:solidFill>
-                      <a:prstDash val="solid"/>
-                      <a:round/>
-                      <a:headEnd type="none" w="med" len="med"/>
-                      <a:tailEnd type="none" w="med" len="med"/>
-                    </a:lnB>
-                    <a:lnTlToBr w="12700" cmpd="sng">
-                      <a:noFill/>
-                      <a:prstDash val="solid"/>
-                    </a:lnTlToBr>
-                    <a:lnBlToTr w="12700" cmpd="sng">
-                      <a:noFill/>
-                      <a:prstDash val="solid"/>
-                    </a:lnBlToTr>
-                  </a:tcPr>
-                </a:tc>
                 <a:extLst>
                   <a:ext uri="{0D108BD9-81ED-4DB2-BD59-A6C34878D82A}">
                     <a16:rowId xmlns:a16="http://schemas.microsoft.com/office/drawing/2014/main" val="10002"/>
@@ -14460,6 +14205,68 @@
                   <a:tcPr marL="5795" marR="5795" marT="5795" marB="27814" anchor="b">
                     <a:lnL w="12700" cmpd="sng">
                       <a:noFill/>
+                    </a:lnL>
+                    <a:lnR w="12700" cap="flat" cmpd="sng" algn="ctr">
+                      <a:solidFill>
+                        <a:schemeClr val="bg1"/>
+                      </a:solidFill>
+                      <a:prstDash val="solid"/>
+                      <a:round/>
+                      <a:headEnd type="none" w="med" len="med"/>
+                      <a:tailEnd type="none" w="med" len="med"/>
+                    </a:lnR>
+                    <a:lnT w="12700" cap="flat" cmpd="sng" algn="ctr">
+                      <a:solidFill>
+                        <a:schemeClr val="bg1"/>
+                      </a:solidFill>
+                      <a:prstDash val="solid"/>
+                      <a:round/>
+                      <a:headEnd type="none" w="med" len="med"/>
+                      <a:tailEnd type="none" w="med" len="med"/>
+                    </a:lnT>
+                    <a:lnB w="12700" cap="flat" cmpd="sng" algn="ctr">
+                      <a:solidFill>
+                        <a:schemeClr val="bg1"/>
+                      </a:solidFill>
+                      <a:prstDash val="solid"/>
+                      <a:round/>
+                      <a:headEnd type="none" w="med" len="med"/>
+                      <a:tailEnd type="none" w="med" len="med"/>
+                    </a:lnB>
+                    <a:lnTlToBr w="12700" cmpd="sng">
+                      <a:noFill/>
+                      <a:prstDash val="solid"/>
+                    </a:lnTlToBr>
+                    <a:lnBlToTr w="12700" cmpd="sng">
+                      <a:noFill/>
+                      <a:prstDash val="solid"/>
+                    </a:lnBlToTr>
+                  </a:tcPr>
+                </a:tc>
+                <a:tc>
+                  <a:txBody>
+                    <a:bodyPr/>
+                    <a:lstStyle/>
+                    <a:p>
+                      <a:pPr algn="ctr" fontAlgn="b"/>
+                      <a:endParaRPr lang="pt-BR" sz="1100" b="0" i="0" u="none" strike="noStrike" dirty="0">
+                        <a:solidFill>
+                          <a:srgbClr val="F94335"/>
+                        </a:solidFill>
+                        <a:latin typeface="Bahnschrift SemiBold SemiConden" panose="020B0502040204020203" pitchFamily="34" charset="0"/>
+                        <a:cs typeface="Arial" pitchFamily="34" charset="0"/>
+                      </a:endParaRPr>
+                    </a:p>
+                  </a:txBody>
+                  <a:tcPr marL="5795" marR="5795" marT="5795" marB="27814" anchor="b">
+                    <a:lnL w="12700" cap="flat" cmpd="sng" algn="ctr">
+                      <a:solidFill>
+                        <a:schemeClr val="bg1"/>
+                      </a:solidFill>
+                      <a:prstDash val="solid"/>
+                      <a:round/>
+                      <a:headEnd type="none" w="med" len="med"/>
+                      <a:tailEnd type="none" w="med" len="med"/>
                     </a:lnL>
                     <a:lnR w="12700" cap="flat" cmpd="sng" algn="ctr">
                       <a:solidFill>
@@ -14651,139 +14458,6 @@
                     </a:lnBlToTr>
                   </a:tcPr>
                 </a:tc>
-                <a:tc>
-                  <a:txBody>
-                    <a:bodyPr/>
-                    <a:lstStyle/>
-                    <a:p>
-                      <a:pPr algn="ctr" fontAlgn="b"/>
-                      <a:r>
-                        <a:rPr lang="pt-BR" sz="1100" u="none" strike="noStrike" dirty="0">
-                          <a:solidFill>
-                            <a:srgbClr val="F94335"/>
-                          </a:solidFill>
-                          <a:latin typeface="Bahnschrift SemiBold SemiConden" panose="020B0502040204020203" pitchFamily="34" charset="0"/>
-                        </a:rPr>
-                        <a:t>5</a:t>
-                      </a:r>
-                      <a:endParaRPr lang="pt-BR" sz="1100" b="0" i="0" u="none" strike="noStrike" dirty="0">
-                        <a:solidFill>
-                          <a:srgbClr val="F94335"/>
-                        </a:solidFill>
-                        <a:latin typeface="Bahnschrift SemiBold SemiConden" panose="020B0502040204020203" pitchFamily="34" charset="0"/>
-                        <a:cs typeface="Arial" pitchFamily="34" charset="0"/>
-                      </a:endParaRPr>
-                    </a:p>
-                  </a:txBody>
-                  <a:tcPr marL="5795" marR="5795" marT="5795" marB="27814" anchor="b">
-                    <a:lnL w="12700" cap="flat" cmpd="sng" algn="ctr">
-                      <a:solidFill>
-                        <a:schemeClr val="bg1"/>
-                      </a:solidFill>
-                      <a:prstDash val="solid"/>
-                      <a:round/>
-                      <a:headEnd type="none" w="med" len="med"/>
-                      <a:tailEnd type="none" w="med" len="med"/>
-                    </a:lnL>
-                    <a:lnR w="12700" cap="flat" cmpd="sng" algn="ctr">
-                      <a:solidFill>
-                        <a:schemeClr val="bg1"/>
-                      </a:solidFill>
-                      <a:prstDash val="solid"/>
-                      <a:round/>
-                      <a:headEnd type="none" w="med" len="med"/>
-                      <a:tailEnd type="none" w="med" len="med"/>
-                    </a:lnR>
-                    <a:lnT w="12700" cap="flat" cmpd="sng" algn="ctr">
-                      <a:solidFill>
-                        <a:schemeClr val="bg1"/>
-                      </a:solidFill>
-                      <a:prstDash val="solid"/>
-                      <a:round/>
-                      <a:headEnd type="none" w="med" len="med"/>
-                      <a:tailEnd type="none" w="med" len="med"/>
-                    </a:lnT>
-                    <a:lnB w="12700" cap="flat" cmpd="sng" algn="ctr">
-                      <a:solidFill>
-                        <a:schemeClr val="bg1"/>
-                      </a:solidFill>
-                      <a:prstDash val="solid"/>
-                      <a:round/>
-                      <a:headEnd type="none" w="med" len="med"/>
-                      <a:tailEnd type="none" w="med" len="med"/>
-                    </a:lnB>
-                    <a:lnTlToBr w="12700" cmpd="sng">
-                      <a:noFill/>
-                      <a:prstDash val="solid"/>
-                    </a:lnTlToBr>
-                    <a:lnBlToTr w="12700" cmpd="sng">
-                      <a:noFill/>
-                      <a:prstDash val="solid"/>
-                    </a:lnBlToTr>
-                  </a:tcPr>
-                </a:tc>
-                <a:tc>
-                  <a:txBody>
-                    <a:bodyPr/>
-                    <a:lstStyle/>
-                    <a:p>
-                      <a:pPr algn="ctr" fontAlgn="b"/>
-                      <a:endParaRPr lang="pt-BR" sz="1100" b="0" i="0" u="none" strike="noStrike" dirty="0">
-                        <a:solidFill>
-                          <a:srgbClr val="F94335"/>
-                        </a:solidFill>
-                        <a:latin typeface="Bahnschrift SemiBold SemiConden" panose="020B0502040204020203" pitchFamily="34" charset="0"/>
-                        <a:cs typeface="Arial" pitchFamily="34" charset="0"/>
-                      </a:endParaRPr>
-                    </a:p>
-                  </a:txBody>
-                  <a:tcPr marL="5795" marR="5795" marT="5795" marB="27814" anchor="b">
-                    <a:lnL w="12700" cap="flat" cmpd="sng" algn="ctr">
-                      <a:solidFill>
-                        <a:schemeClr val="bg1"/>
-                      </a:solidFill>
-                      <a:prstDash val="solid"/>
-                      <a:round/>
-                      <a:headEnd type="none" w="med" len="med"/>
-                      <a:tailEnd type="none" w="med" len="med"/>
-                    </a:lnL>
-                    <a:lnR w="12700" cap="flat" cmpd="sng" algn="ctr">
-                      <a:solidFill>
-                        <a:schemeClr val="bg1"/>
-                      </a:solidFill>
-                      <a:prstDash val="solid"/>
-                      <a:round/>
-                      <a:headEnd type="none" w="med" len="med"/>
-                      <a:tailEnd type="none" w="med" len="med"/>
-                    </a:lnR>
-                    <a:lnT w="12700" cap="flat" cmpd="sng" algn="ctr">
-                      <a:solidFill>
-                        <a:schemeClr val="bg1"/>
-                      </a:solidFill>
-                      <a:prstDash val="solid"/>
-                      <a:round/>
-                      <a:headEnd type="none" w="med" len="med"/>
-                      <a:tailEnd type="none" w="med" len="med"/>
-                    </a:lnT>
-                    <a:lnB w="12700" cap="flat" cmpd="sng" algn="ctr">
-                      <a:solidFill>
-                        <a:schemeClr val="bg1"/>
-                      </a:solidFill>
-                      <a:prstDash val="solid"/>
-                      <a:round/>
-                      <a:headEnd type="none" w="med" len="med"/>
-                      <a:tailEnd type="none" w="med" len="med"/>
-                    </a:lnB>
-                    <a:lnTlToBr w="12700" cmpd="sng">
-                      <a:noFill/>
-                      <a:prstDash val="solid"/>
-                    </a:lnTlToBr>
-                    <a:lnBlToTr w="12700" cmpd="sng">
-                      <a:noFill/>
-                      <a:prstDash val="solid"/>
-                    </a:lnBlToTr>
-                  </a:tcPr>
-                </a:tc>
                 <a:extLst>
                   <a:ext uri="{0D108BD9-81ED-4DB2-BD59-A6C34878D82A}">
                     <a16:rowId xmlns:a16="http://schemas.microsoft.com/office/drawing/2014/main" val="10003"/>
@@ -14818,6 +14492,84 @@
                   <a:tcPr marL="5795" marR="5795" marT="5795" marB="27814" anchor="b">
                     <a:lnL w="12700" cmpd="sng">
                       <a:noFill/>
+                    </a:lnL>
+                    <a:lnR w="12700" cap="flat" cmpd="sng" algn="ctr">
+                      <a:solidFill>
+                        <a:schemeClr val="bg1"/>
+                      </a:solidFill>
+                      <a:prstDash val="solid"/>
+                      <a:round/>
+                      <a:headEnd type="none" w="med" len="med"/>
+                      <a:tailEnd type="none" w="med" len="med"/>
+                    </a:lnR>
+                    <a:lnT w="12700" cap="flat" cmpd="sng" algn="ctr">
+                      <a:solidFill>
+                        <a:schemeClr val="bg1"/>
+                      </a:solidFill>
+                      <a:prstDash val="solid"/>
+                      <a:round/>
+                      <a:headEnd type="none" w="med" len="med"/>
+                      <a:tailEnd type="none" w="med" len="med"/>
+                    </a:lnT>
+                    <a:lnB w="12700" cap="flat" cmpd="sng" algn="ctr">
+                      <a:solidFill>
+                        <a:schemeClr val="bg1"/>
+                      </a:solidFill>
+                      <a:prstDash val="solid"/>
+                      <a:round/>
+                      <a:headEnd type="none" w="med" len="med"/>
+                      <a:tailEnd type="none" w="med" len="med"/>
+                    </a:lnB>
+                    <a:lnTlToBr w="12700" cmpd="sng">
+                      <a:noFill/>
+                      <a:prstDash val="solid"/>
+                    </a:lnTlToBr>
+                    <a:lnBlToTr w="12700" cmpd="sng">
+                      <a:noFill/>
+                      <a:prstDash val="solid"/>
+                    </a:lnBlToTr>
+                  </a:tcPr>
+                </a:tc>
+                <a:tc>
+                  <a:txBody>
+                    <a:bodyPr/>
+                    <a:lstStyle/>
+                    <a:p>
+                      <a:pPr marL="0" marR="0" lvl="0" indent="0" algn="ctr" defTabSz="914400" rtl="0" eaLnBrk="1" fontAlgn="b" latinLnBrk="0" hangingPunct="1">
+                        <a:lnSpc>
+                          <a:spcPct val="100000"/>
+                        </a:lnSpc>
+                        <a:spcBef>
+                          <a:spcPts val="0"/>
+                        </a:spcBef>
+                        <a:spcAft>
+                          <a:spcPts val="0"/>
+                        </a:spcAft>
+                        <a:buClrTx/>
+                        <a:buSzTx/>
+                        <a:buFontTx/>
+                        <a:buNone/>
+                        <a:tabLst/>
+                        <a:defRPr/>
+                      </a:pPr>
+                      <a:endParaRPr lang="pt-BR" sz="1100" b="0" i="0" u="none" strike="noStrike" dirty="0">
+                        <a:solidFill>
+                          <a:srgbClr val="F94335"/>
+                        </a:solidFill>
+                        <a:latin typeface="Bahnschrift SemiBold SemiConden" panose="020B0502040204020203" pitchFamily="34" charset="0"/>
+                        <a:cs typeface="Arial" pitchFamily="34" charset="0"/>
+                      </a:endParaRPr>
+                    </a:p>
+                  </a:txBody>
+                  <a:tcPr marL="5795" marR="5795" marT="5795" marB="27814" anchor="b">
+                    <a:lnL w="12700" cap="flat" cmpd="sng" algn="ctr">
+                      <a:solidFill>
+                        <a:schemeClr val="bg1"/>
+                      </a:solidFill>
+                      <a:prstDash val="solid"/>
+                      <a:round/>
+                      <a:headEnd type="none" w="med" len="med"/>
+                      <a:tailEnd type="none" w="med" len="med"/>
                     </a:lnL>
                     <a:lnR w="12700" cap="flat" cmpd="sng" algn="ctr">
                       <a:solidFill>
@@ -15014,139 +14766,6 @@
                     </a:lnBlToTr>
                   </a:tcPr>
                 </a:tc>
-                <a:tc>
-                  <a:txBody>
-                    <a:bodyPr/>
-                    <a:lstStyle/>
-                    <a:p>
-                      <a:pPr algn="ctr" fontAlgn="b"/>
-                      <a:r>
-                        <a:rPr lang="pt-BR" sz="1100" u="none" strike="noStrike" dirty="0">
-                          <a:solidFill>
-                            <a:srgbClr val="F94335"/>
-                          </a:solidFill>
-                          <a:latin typeface="Bahnschrift SemiBold SemiConden" panose="020B0502040204020203" pitchFamily="34" charset="0"/>
-                        </a:rPr>
-                        <a:t>5</a:t>
-                      </a:r>
-                      <a:endParaRPr lang="pt-BR" sz="1100" b="0" i="0" u="none" strike="noStrike" dirty="0">
-                        <a:solidFill>
-                          <a:srgbClr val="F94335"/>
-                        </a:solidFill>
-                        <a:latin typeface="Bahnschrift SemiBold SemiConden" panose="020B0502040204020203" pitchFamily="34" charset="0"/>
-                        <a:cs typeface="Arial" pitchFamily="34" charset="0"/>
-                      </a:endParaRPr>
-                    </a:p>
-                  </a:txBody>
-                  <a:tcPr marL="5795" marR="5795" marT="5795" marB="27814" anchor="b">
-                    <a:lnL w="12700" cap="flat" cmpd="sng" algn="ctr">
-                      <a:solidFill>
-                        <a:schemeClr val="bg1"/>
-                      </a:solidFill>
-                      <a:prstDash val="solid"/>
-                      <a:round/>
-                      <a:headEnd type="none" w="med" len="med"/>
-                      <a:tailEnd type="none" w="med" len="med"/>
-                    </a:lnL>
-                    <a:lnR w="12700" cap="flat" cmpd="sng" algn="ctr">
-                      <a:solidFill>
-                        <a:schemeClr val="bg1"/>
-                      </a:solidFill>
-                      <a:prstDash val="solid"/>
-                      <a:round/>
-                      <a:headEnd type="none" w="med" len="med"/>
-                      <a:tailEnd type="none" w="med" len="med"/>
-                    </a:lnR>
-                    <a:lnT w="12700" cap="flat" cmpd="sng" algn="ctr">
-                      <a:solidFill>
-                        <a:schemeClr val="bg1"/>
-                      </a:solidFill>
-                      <a:prstDash val="solid"/>
-                      <a:round/>
-                      <a:headEnd type="none" w="med" len="med"/>
-                      <a:tailEnd type="none" w="med" len="med"/>
-                    </a:lnT>
-                    <a:lnB w="12700" cap="flat" cmpd="sng" algn="ctr">
-                      <a:solidFill>
-                        <a:schemeClr val="bg1"/>
-                      </a:solidFill>
-                      <a:prstDash val="solid"/>
-                      <a:round/>
-                      <a:headEnd type="none" w="med" len="med"/>
-                      <a:tailEnd type="none" w="med" len="med"/>
-                    </a:lnB>
-                    <a:lnTlToBr w="12700" cmpd="sng">
-                      <a:noFill/>
-                      <a:prstDash val="solid"/>
-                    </a:lnTlToBr>
-                    <a:lnBlToTr w="12700" cmpd="sng">
-                      <a:noFill/>
-                      <a:prstDash val="solid"/>
-                    </a:lnBlToTr>
-                  </a:tcPr>
-                </a:tc>
-                <a:tc>
-                  <a:txBody>
-                    <a:bodyPr/>
-                    <a:lstStyle/>
-                    <a:p>
-                      <a:pPr algn="ctr" fontAlgn="b"/>
-                      <a:endParaRPr lang="pt-BR" sz="1100" b="0" i="0" u="none" strike="noStrike" dirty="0">
-                        <a:solidFill>
-                          <a:srgbClr val="F94335"/>
-                        </a:solidFill>
-                        <a:latin typeface="Bahnschrift SemiBold SemiConden" panose="020B0502040204020203" pitchFamily="34" charset="0"/>
-                        <a:cs typeface="Arial" pitchFamily="34" charset="0"/>
-                      </a:endParaRPr>
-                    </a:p>
-                  </a:txBody>
-                  <a:tcPr marL="5795" marR="5795" marT="5795" marB="27814" anchor="b">
-                    <a:lnL w="12700" cap="flat" cmpd="sng" algn="ctr">
-                      <a:solidFill>
-                        <a:schemeClr val="bg1"/>
-                      </a:solidFill>
-                      <a:prstDash val="solid"/>
-                      <a:round/>
-                      <a:headEnd type="none" w="med" len="med"/>
-                      <a:tailEnd type="none" w="med" len="med"/>
-                    </a:lnL>
-                    <a:lnR w="12700" cap="flat" cmpd="sng" algn="ctr">
-                      <a:solidFill>
-                        <a:schemeClr val="bg1"/>
-                      </a:solidFill>
-                      <a:prstDash val="solid"/>
-                      <a:round/>
-                      <a:headEnd type="none" w="med" len="med"/>
-                      <a:tailEnd type="none" w="med" len="med"/>
-                    </a:lnR>
-                    <a:lnT w="12700" cap="flat" cmpd="sng" algn="ctr">
-                      <a:solidFill>
-                        <a:schemeClr val="bg1"/>
-                      </a:solidFill>
-                      <a:prstDash val="solid"/>
-                      <a:round/>
-                      <a:headEnd type="none" w="med" len="med"/>
-                      <a:tailEnd type="none" w="med" len="med"/>
-                    </a:lnT>
-                    <a:lnB w="12700" cap="flat" cmpd="sng" algn="ctr">
-                      <a:solidFill>
-                        <a:schemeClr val="bg1"/>
-                      </a:solidFill>
-                      <a:prstDash val="solid"/>
-                      <a:round/>
-                      <a:headEnd type="none" w="med" len="med"/>
-                      <a:tailEnd type="none" w="med" len="med"/>
-                    </a:lnB>
-                    <a:lnTlToBr w="12700" cmpd="sng">
-                      <a:noFill/>
-                      <a:prstDash val="solid"/>
-                    </a:lnTlToBr>
-                    <a:lnBlToTr w="12700" cmpd="sng">
-                      <a:noFill/>
-                      <a:prstDash val="solid"/>
-                    </a:lnBlToTr>
-                  </a:tcPr>
-                </a:tc>
                 <a:extLst>
                   <a:ext uri="{0D108BD9-81ED-4DB2-BD59-A6C34878D82A}">
                     <a16:rowId xmlns:a16="http://schemas.microsoft.com/office/drawing/2014/main" val="10004"/>
@@ -15225,6 +14844,68 @@
                     <a:lstStyle/>
                     <a:p>
                       <a:pPr algn="ctr" fontAlgn="b"/>
+                      <a:endParaRPr lang="pt-BR" sz="1100" b="0" i="0" u="none" strike="noStrike" dirty="0">
+                        <a:solidFill>
+                          <a:srgbClr val="F94335"/>
+                        </a:solidFill>
+                        <a:latin typeface="Bahnschrift SemiBold SemiConden" panose="020B0502040204020203" pitchFamily="34" charset="0"/>
+                        <a:cs typeface="Arial" pitchFamily="34" charset="0"/>
+                      </a:endParaRPr>
+                    </a:p>
+                  </a:txBody>
+                  <a:tcPr marL="5795" marR="5795" marT="5795" marB="27814" anchor="b">
+                    <a:lnL w="12700" cap="flat" cmpd="sng" algn="ctr">
+                      <a:solidFill>
+                        <a:schemeClr val="bg1"/>
+                      </a:solidFill>
+                      <a:prstDash val="solid"/>
+                      <a:round/>
+                      <a:headEnd type="none" w="med" len="med"/>
+                      <a:tailEnd type="none" w="med" len="med"/>
+                    </a:lnL>
+                    <a:lnR w="12700" cap="flat" cmpd="sng" algn="ctr">
+                      <a:solidFill>
+                        <a:schemeClr val="bg1"/>
+                      </a:solidFill>
+                      <a:prstDash val="solid"/>
+                      <a:round/>
+                      <a:headEnd type="none" w="med" len="med"/>
+                      <a:tailEnd type="none" w="med" len="med"/>
+                    </a:lnR>
+                    <a:lnT w="12700" cap="flat" cmpd="sng" algn="ctr">
+                      <a:solidFill>
+                        <a:schemeClr val="bg1"/>
+                      </a:solidFill>
+                      <a:prstDash val="solid"/>
+                      <a:round/>
+                      <a:headEnd type="none" w="med" len="med"/>
+                      <a:tailEnd type="none" w="med" len="med"/>
+                    </a:lnT>
+                    <a:lnB w="12700" cap="flat" cmpd="sng" algn="ctr">
+                      <a:solidFill>
+                        <a:schemeClr val="bg1"/>
+                      </a:solidFill>
+                      <a:prstDash val="solid"/>
+                      <a:round/>
+                      <a:headEnd type="none" w="med" len="med"/>
+                      <a:tailEnd type="none" w="med" len="med"/>
+                    </a:lnB>
+                    <a:lnTlToBr w="12700" cmpd="sng">
+                      <a:noFill/>
+                      <a:prstDash val="solid"/>
+                    </a:lnTlToBr>
+                    <a:lnBlToTr w="12700" cmpd="sng">
+                      <a:noFill/>
+                      <a:prstDash val="solid"/>
+                    </a:lnBlToTr>
+                  </a:tcPr>
+                </a:tc>
+                <a:tc>
+                  <a:txBody>
+                    <a:bodyPr/>
+                    <a:lstStyle/>
+                    <a:p>
+                      <a:pPr algn="ctr" fontAlgn="b"/>
                       <a:r>
                         <a:rPr lang="pt-BR" sz="1100" u="none" strike="noStrike" dirty="0">
                           <a:solidFill>
@@ -15361,133 +15042,6 @@
                     </a:lnBlToTr>
                   </a:tcPr>
                 </a:tc>
-                <a:tc>
-                  <a:txBody>
-                    <a:bodyPr/>
-                    <a:lstStyle/>
-                    <a:p>
-                      <a:pPr algn="ctr" fontAlgn="b"/>
-                      <a:r>
-                        <a:rPr lang="pt-BR" sz="1100" b="0" i="0" u="none" strike="noStrike" dirty="0">
-                          <a:solidFill>
-                            <a:srgbClr val="F94335"/>
-                          </a:solidFill>
-                          <a:latin typeface="Bahnschrift SemiBold SemiConden" panose="020B0502040204020203" pitchFamily="34" charset="0"/>
-                          <a:cs typeface="Arial" pitchFamily="34" charset="0"/>
-                        </a:rPr>
-                        <a:t>13</a:t>
-                      </a:r>
-                    </a:p>
-                  </a:txBody>
-                  <a:tcPr marL="5795" marR="5795" marT="5795" marB="27814" anchor="b">
-                    <a:lnL w="12700" cap="flat" cmpd="sng" algn="ctr">
-                      <a:solidFill>
-                        <a:schemeClr val="bg1"/>
-                      </a:solidFill>
-                      <a:prstDash val="solid"/>
-                      <a:round/>
-                      <a:headEnd type="none" w="med" len="med"/>
-                      <a:tailEnd type="none" w="med" len="med"/>
-                    </a:lnL>
-                    <a:lnR w="12700" cap="flat" cmpd="sng" algn="ctr">
-                      <a:solidFill>
-                        <a:schemeClr val="bg1"/>
-                      </a:solidFill>
-                      <a:prstDash val="solid"/>
-                      <a:round/>
-                      <a:headEnd type="none" w="med" len="med"/>
-                      <a:tailEnd type="none" w="med" len="med"/>
-                    </a:lnR>
-                    <a:lnT w="12700" cap="flat" cmpd="sng" algn="ctr">
-                      <a:solidFill>
-                        <a:schemeClr val="bg1"/>
-                      </a:solidFill>
-                      <a:prstDash val="solid"/>
-                      <a:round/>
-                      <a:headEnd type="none" w="med" len="med"/>
-                      <a:tailEnd type="none" w="med" len="med"/>
-                    </a:lnT>
-                    <a:lnB w="12700" cap="flat" cmpd="sng" algn="ctr">
-                      <a:solidFill>
-                        <a:schemeClr val="bg1"/>
-                      </a:solidFill>
-                      <a:prstDash val="solid"/>
-                      <a:round/>
-                      <a:headEnd type="none" w="med" len="med"/>
-                      <a:tailEnd type="none" w="med" len="med"/>
-                    </a:lnB>
-                    <a:lnTlToBr w="12700" cmpd="sng">
-                      <a:noFill/>
-                      <a:prstDash val="solid"/>
-                    </a:lnTlToBr>
-                    <a:lnBlToTr w="12700" cmpd="sng">
-                      <a:noFill/>
-                      <a:prstDash val="solid"/>
-                    </a:lnBlToTr>
-                  </a:tcPr>
-                </a:tc>
-                <a:tc>
-                  <a:txBody>
-                    <a:bodyPr/>
-                    <a:lstStyle/>
-                    <a:p>
-                      <a:pPr algn="ctr" fontAlgn="b"/>
-                      <a:endParaRPr lang="pt-BR" sz="1100" b="0" i="0" u="none" strike="noStrike" dirty="0">
-                        <a:solidFill>
-                          <a:srgbClr val="F94335"/>
-                        </a:solidFill>
-                        <a:latin typeface="Bahnschrift SemiBold SemiConden" panose="020B0502040204020203" pitchFamily="34" charset="0"/>
-                        <a:cs typeface="Arial" pitchFamily="34" charset="0"/>
-                      </a:endParaRPr>
-                    </a:p>
-                  </a:txBody>
-                  <a:tcPr marL="5795" marR="5795" marT="5795" marB="27814" anchor="b">
-                    <a:lnL w="12700" cap="flat" cmpd="sng" algn="ctr">
-                      <a:solidFill>
-                        <a:schemeClr val="bg1"/>
-                      </a:solidFill>
-                      <a:prstDash val="solid"/>
-                      <a:round/>
-                      <a:headEnd type="none" w="med" len="med"/>
-                      <a:tailEnd type="none" w="med" len="med"/>
-                    </a:lnL>
-                    <a:lnR w="12700" cap="flat" cmpd="sng" algn="ctr">
-                      <a:solidFill>
-                        <a:schemeClr val="bg1"/>
-                      </a:solidFill>
-                      <a:prstDash val="solid"/>
-                      <a:round/>
-                      <a:headEnd type="none" w="med" len="med"/>
-                      <a:tailEnd type="none" w="med" len="med"/>
-                    </a:lnR>
-                    <a:lnT w="12700" cap="flat" cmpd="sng" algn="ctr">
-                      <a:solidFill>
-                        <a:schemeClr val="bg1"/>
-                      </a:solidFill>
-                      <a:prstDash val="solid"/>
-                      <a:round/>
-                      <a:headEnd type="none" w="med" len="med"/>
-                      <a:tailEnd type="none" w="med" len="med"/>
-                    </a:lnT>
-                    <a:lnB w="12700" cap="flat" cmpd="sng" algn="ctr">
-                      <a:solidFill>
-                        <a:schemeClr val="bg1"/>
-                      </a:solidFill>
-                      <a:prstDash val="solid"/>
-                      <a:round/>
-                      <a:headEnd type="none" w="med" len="med"/>
-                      <a:tailEnd type="none" w="med" len="med"/>
-                    </a:lnB>
-                    <a:lnTlToBr w="12700" cmpd="sng">
-                      <a:noFill/>
-                      <a:prstDash val="solid"/>
-                    </a:lnTlToBr>
-                    <a:lnBlToTr w="12700" cmpd="sng">
-                      <a:noFill/>
-                      <a:prstDash val="solid"/>
-                    </a:lnBlToTr>
-                  </a:tcPr>
-                </a:tc>
                 <a:extLst>
                   <a:ext uri="{0D108BD9-81ED-4DB2-BD59-A6C34878D82A}">
                     <a16:rowId xmlns:a16="http://schemas.microsoft.com/office/drawing/2014/main" val="10005"/>
@@ -15516,6 +15070,68 @@
                   <a:tcPr marL="5795" marR="5795" marT="5795" marB="27814" anchor="b">
                     <a:lnL w="12700" cmpd="sng">
                       <a:noFill/>
+                    </a:lnL>
+                    <a:lnR w="12700" cap="flat" cmpd="sng" algn="ctr">
+                      <a:solidFill>
+                        <a:schemeClr val="bg1"/>
+                      </a:solidFill>
+                      <a:prstDash val="solid"/>
+                      <a:round/>
+                      <a:headEnd type="none" w="med" len="med"/>
+                      <a:tailEnd type="none" w="med" len="med"/>
+                    </a:lnR>
+                    <a:lnT w="12700" cap="flat" cmpd="sng" algn="ctr">
+                      <a:solidFill>
+                        <a:schemeClr val="bg1"/>
+                      </a:solidFill>
+                      <a:prstDash val="solid"/>
+                      <a:round/>
+                      <a:headEnd type="none" w="med" len="med"/>
+                      <a:tailEnd type="none" w="med" len="med"/>
+                    </a:lnT>
+                    <a:lnB w="12700" cap="flat" cmpd="sng" algn="ctr">
+                      <a:solidFill>
+                        <a:schemeClr val="bg1"/>
+                      </a:solidFill>
+                      <a:prstDash val="solid"/>
+                      <a:round/>
+                      <a:headEnd type="none" w="med" len="med"/>
+                      <a:tailEnd type="none" w="med" len="med"/>
+                    </a:lnB>
+                    <a:lnTlToBr w="12700" cmpd="sng">
+                      <a:noFill/>
+                      <a:prstDash val="solid"/>
+                    </a:lnTlToBr>
+                    <a:lnBlToTr w="12700" cmpd="sng">
+                      <a:noFill/>
+                      <a:prstDash val="solid"/>
+                    </a:lnBlToTr>
+                  </a:tcPr>
+                </a:tc>
+                <a:tc>
+                  <a:txBody>
+                    <a:bodyPr/>
+                    <a:lstStyle/>
+                    <a:p>
+                      <a:pPr algn="ctr" fontAlgn="b"/>
+                      <a:endParaRPr lang="pt-BR" sz="1100" b="0" i="0" u="none" strike="noStrike" dirty="0">
+                        <a:solidFill>
+                          <a:srgbClr val="F94335"/>
+                        </a:solidFill>
+                        <a:latin typeface="Bahnschrift SemiBold SemiConden" panose="020B0502040204020203" pitchFamily="34" charset="0"/>
+                        <a:cs typeface="Arial" pitchFamily="34" charset="0"/>
+                      </a:endParaRPr>
+                    </a:p>
+                  </a:txBody>
+                  <a:tcPr marL="5795" marR="5795" marT="5795" marB="27814" anchor="b">
+                    <a:lnL w="12700" cap="flat" cmpd="sng" algn="ctr">
+                      <a:solidFill>
+                        <a:schemeClr val="bg1"/>
+                      </a:solidFill>
+                      <a:prstDash val="solid"/>
+                      <a:round/>
+                      <a:headEnd type="none" w="med" len="med"/>
+                      <a:tailEnd type="none" w="med" len="med"/>
                     </a:lnL>
                     <a:lnR w="12700" cap="flat" cmpd="sng" algn="ctr">
                       <a:solidFill>
@@ -15714,139 +15330,6 @@
                     </a:lnBlToTr>
                   </a:tcPr>
                 </a:tc>
-                <a:tc>
-                  <a:txBody>
-                    <a:bodyPr/>
-                    <a:lstStyle/>
-                    <a:p>
-                      <a:pPr algn="ctr" fontAlgn="b"/>
-                      <a:r>
-                        <a:rPr lang="pt-BR" sz="1100" u="none" strike="noStrike" dirty="0">
-                          <a:solidFill>
-                            <a:srgbClr val="F94335"/>
-                          </a:solidFill>
-                          <a:latin typeface="Bahnschrift SemiBold SemiConden" panose="020B0502040204020203" pitchFamily="34" charset="0"/>
-                        </a:rPr>
-                        <a:t>13</a:t>
-                      </a:r>
-                      <a:endParaRPr lang="pt-BR" sz="1100" b="0" i="0" u="none" strike="noStrike" dirty="0">
-                        <a:solidFill>
-                          <a:srgbClr val="F94335"/>
-                        </a:solidFill>
-                        <a:latin typeface="Bahnschrift SemiBold SemiConden" panose="020B0502040204020203" pitchFamily="34" charset="0"/>
-                        <a:cs typeface="Arial" pitchFamily="34" charset="0"/>
-                      </a:endParaRPr>
-                    </a:p>
-                  </a:txBody>
-                  <a:tcPr marL="5795" marR="5795" marT="5795" marB="27814" anchor="b">
-                    <a:lnL w="12700" cap="flat" cmpd="sng" algn="ctr">
-                      <a:solidFill>
-                        <a:schemeClr val="bg1"/>
-                      </a:solidFill>
-                      <a:prstDash val="solid"/>
-                      <a:round/>
-                      <a:headEnd type="none" w="med" len="med"/>
-                      <a:tailEnd type="none" w="med" len="med"/>
-                    </a:lnL>
-                    <a:lnR w="12700" cap="flat" cmpd="sng" algn="ctr">
-                      <a:solidFill>
-                        <a:schemeClr val="bg1"/>
-                      </a:solidFill>
-                      <a:prstDash val="solid"/>
-                      <a:round/>
-                      <a:headEnd type="none" w="med" len="med"/>
-                      <a:tailEnd type="none" w="med" len="med"/>
-                    </a:lnR>
-                    <a:lnT w="12700" cap="flat" cmpd="sng" algn="ctr">
-                      <a:solidFill>
-                        <a:schemeClr val="bg1"/>
-                      </a:solidFill>
-                      <a:prstDash val="solid"/>
-                      <a:round/>
-                      <a:headEnd type="none" w="med" len="med"/>
-                      <a:tailEnd type="none" w="med" len="med"/>
-                    </a:lnT>
-                    <a:lnB w="12700" cap="flat" cmpd="sng" algn="ctr">
-                      <a:solidFill>
-                        <a:schemeClr val="bg1"/>
-                      </a:solidFill>
-                      <a:prstDash val="solid"/>
-                      <a:round/>
-                      <a:headEnd type="none" w="med" len="med"/>
-                      <a:tailEnd type="none" w="med" len="med"/>
-                    </a:lnB>
-                    <a:lnTlToBr w="12700" cmpd="sng">
-                      <a:noFill/>
-                      <a:prstDash val="solid"/>
-                    </a:lnTlToBr>
-                    <a:lnBlToTr w="12700" cmpd="sng">
-                      <a:noFill/>
-                      <a:prstDash val="solid"/>
-                    </a:lnBlToTr>
-                  </a:tcPr>
-                </a:tc>
-                <a:tc>
-                  <a:txBody>
-                    <a:bodyPr/>
-                    <a:lstStyle/>
-                    <a:p>
-                      <a:pPr algn="ctr" fontAlgn="b"/>
-                      <a:endParaRPr lang="pt-BR" sz="1100" b="0" i="0" u="none" strike="noStrike" dirty="0">
-                        <a:solidFill>
-                          <a:srgbClr val="F94335"/>
-                        </a:solidFill>
-                        <a:latin typeface="Bahnschrift SemiBold SemiConden" panose="020B0502040204020203" pitchFamily="34" charset="0"/>
-                        <a:cs typeface="Arial" pitchFamily="34" charset="0"/>
-                      </a:endParaRPr>
-                    </a:p>
-                  </a:txBody>
-                  <a:tcPr marL="5795" marR="5795" marT="5795" marB="27814" anchor="b">
-                    <a:lnL w="12700" cap="flat" cmpd="sng" algn="ctr">
-                      <a:solidFill>
-                        <a:schemeClr val="bg1"/>
-                      </a:solidFill>
-                      <a:prstDash val="solid"/>
-                      <a:round/>
-                      <a:headEnd type="none" w="med" len="med"/>
-                      <a:tailEnd type="none" w="med" len="med"/>
-                    </a:lnL>
-                    <a:lnR w="12700" cap="flat" cmpd="sng" algn="ctr">
-                      <a:solidFill>
-                        <a:schemeClr val="bg1"/>
-                      </a:solidFill>
-                      <a:prstDash val="solid"/>
-                      <a:round/>
-                      <a:headEnd type="none" w="med" len="med"/>
-                      <a:tailEnd type="none" w="med" len="med"/>
-                    </a:lnR>
-                    <a:lnT w="12700" cap="flat" cmpd="sng" algn="ctr">
-                      <a:solidFill>
-                        <a:schemeClr val="bg1"/>
-                      </a:solidFill>
-                      <a:prstDash val="solid"/>
-                      <a:round/>
-                      <a:headEnd type="none" w="med" len="med"/>
-                      <a:tailEnd type="none" w="med" len="med"/>
-                    </a:lnT>
-                    <a:lnB w="12700" cap="flat" cmpd="sng" algn="ctr">
-                      <a:solidFill>
-                        <a:schemeClr val="bg1"/>
-                      </a:solidFill>
-                      <a:prstDash val="solid"/>
-                      <a:round/>
-                      <a:headEnd type="none" w="med" len="med"/>
-                      <a:tailEnd type="none" w="med" len="med"/>
-                    </a:lnB>
-                    <a:lnTlToBr w="12700" cmpd="sng">
-                      <a:noFill/>
-                      <a:prstDash val="solid"/>
-                    </a:lnTlToBr>
-                    <a:lnBlToTr w="12700" cmpd="sng">
-                      <a:noFill/>
-                      <a:prstDash val="solid"/>
-                    </a:lnBlToTr>
-                  </a:tcPr>
-                </a:tc>
                 <a:extLst>
                   <a:ext uri="{0D108BD9-81ED-4DB2-BD59-A6C34878D82A}">
                     <a16:rowId xmlns:a16="http://schemas.microsoft.com/office/drawing/2014/main" val="10007"/>
@@ -15919,6 +15402,68 @@
                     <a:lstStyle/>
                     <a:p>
                       <a:pPr algn="ctr" fontAlgn="b"/>
+                      <a:endParaRPr lang="pt-BR" sz="1100" b="0" i="0" u="none" strike="noStrike" dirty="0">
+                        <a:solidFill>
+                          <a:srgbClr val="F94335"/>
+                        </a:solidFill>
+                        <a:latin typeface="Bahnschrift SemiBold SemiConden" panose="020B0502040204020203" pitchFamily="34" charset="0"/>
+                        <a:cs typeface="Arial" pitchFamily="34" charset="0"/>
+                      </a:endParaRPr>
+                    </a:p>
+                  </a:txBody>
+                  <a:tcPr marL="5795" marR="5795" marT="5795" marB="27814" anchor="b">
+                    <a:lnL w="12700" cap="flat" cmpd="sng" algn="ctr">
+                      <a:solidFill>
+                        <a:schemeClr val="bg1"/>
+                      </a:solidFill>
+                      <a:prstDash val="solid"/>
+                      <a:round/>
+                      <a:headEnd type="none" w="med" len="med"/>
+                      <a:tailEnd type="none" w="med" len="med"/>
+                    </a:lnL>
+                    <a:lnR w="12700" cap="flat" cmpd="sng" algn="ctr">
+                      <a:solidFill>
+                        <a:schemeClr val="bg1"/>
+                      </a:solidFill>
+                      <a:prstDash val="solid"/>
+                      <a:round/>
+                      <a:headEnd type="none" w="med" len="med"/>
+                      <a:tailEnd type="none" w="med" len="med"/>
+                    </a:lnR>
+                    <a:lnT w="12700" cap="flat" cmpd="sng" algn="ctr">
+                      <a:solidFill>
+                        <a:schemeClr val="bg1"/>
+                      </a:solidFill>
+                      <a:prstDash val="solid"/>
+                      <a:round/>
+                      <a:headEnd type="none" w="med" len="med"/>
+                      <a:tailEnd type="none" w="med" len="med"/>
+                    </a:lnT>
+                    <a:lnB w="12700" cap="flat" cmpd="sng" algn="ctr">
+                      <a:solidFill>
+                        <a:schemeClr val="bg1"/>
+                      </a:solidFill>
+                      <a:prstDash val="solid"/>
+                      <a:round/>
+                      <a:headEnd type="none" w="med" len="med"/>
+                      <a:tailEnd type="none" w="med" len="med"/>
+                    </a:lnB>
+                    <a:lnTlToBr w="12700" cmpd="sng">
+                      <a:noFill/>
+                      <a:prstDash val="solid"/>
+                    </a:lnTlToBr>
+                    <a:lnBlToTr w="12700" cmpd="sng">
+                      <a:noFill/>
+                      <a:prstDash val="solid"/>
+                    </a:lnBlToTr>
+                  </a:tcPr>
+                </a:tc>
+                <a:tc>
+                  <a:txBody>
+                    <a:bodyPr/>
+                    <a:lstStyle/>
+                    <a:p>
+                      <a:pPr algn="ctr" fontAlgn="b"/>
                       <a:r>
                         <a:rPr lang="pt-BR" sz="1100" b="0" i="0" u="none" strike="noStrike" dirty="0" smtClean="0">
                           <a:solidFill>
@@ -16056,133 +15601,6 @@
                     </a:lnBlToTr>
                   </a:tcPr>
                 </a:tc>
-                <a:tc>
-                  <a:txBody>
-                    <a:bodyPr/>
-                    <a:lstStyle/>
-                    <a:p>
-                      <a:pPr algn="ctr" fontAlgn="b"/>
-                      <a:r>
-                        <a:rPr lang="pt-BR" sz="1100" b="0" i="0" u="none" strike="noStrike" dirty="0">
-                          <a:solidFill>
-                            <a:srgbClr val="F94335"/>
-                          </a:solidFill>
-                          <a:latin typeface="Bahnschrift SemiBold SemiConden" panose="020B0502040204020203" pitchFamily="34" charset="0"/>
-                          <a:cs typeface="Arial" pitchFamily="34" charset="0"/>
-                        </a:rPr>
-                        <a:t>8</a:t>
-                      </a:r>
-                    </a:p>
-                  </a:txBody>
-                  <a:tcPr marL="5795" marR="5795" marT="5795" marB="27814" anchor="b">
-                    <a:lnL w="12700" cap="flat" cmpd="sng" algn="ctr">
-                      <a:solidFill>
-                        <a:schemeClr val="bg1"/>
-                      </a:solidFill>
-                      <a:prstDash val="solid"/>
-                      <a:round/>
-                      <a:headEnd type="none" w="med" len="med"/>
-                      <a:tailEnd type="none" w="med" len="med"/>
-                    </a:lnL>
-                    <a:lnR w="12700" cap="flat" cmpd="sng" algn="ctr">
-                      <a:solidFill>
-                        <a:schemeClr val="bg1"/>
-                      </a:solidFill>
-                      <a:prstDash val="solid"/>
-                      <a:round/>
-                      <a:headEnd type="none" w="med" len="med"/>
-                      <a:tailEnd type="none" w="med" len="med"/>
-                    </a:lnR>
-                    <a:lnT w="12700" cap="flat" cmpd="sng" algn="ctr">
-                      <a:solidFill>
-                        <a:schemeClr val="bg1"/>
-                      </a:solidFill>
-                      <a:prstDash val="solid"/>
-                      <a:round/>
-                      <a:headEnd type="none" w="med" len="med"/>
-                      <a:tailEnd type="none" w="med" len="med"/>
-                    </a:lnT>
-                    <a:lnB w="12700" cap="flat" cmpd="sng" algn="ctr">
-                      <a:solidFill>
-                        <a:schemeClr val="bg1"/>
-                      </a:solidFill>
-                      <a:prstDash val="solid"/>
-                      <a:round/>
-                      <a:headEnd type="none" w="med" len="med"/>
-                      <a:tailEnd type="none" w="med" len="med"/>
-                    </a:lnB>
-                    <a:lnTlToBr w="12700" cmpd="sng">
-                      <a:noFill/>
-                      <a:prstDash val="solid"/>
-                    </a:lnTlToBr>
-                    <a:lnBlToTr w="12700" cmpd="sng">
-                      <a:noFill/>
-                      <a:prstDash val="solid"/>
-                    </a:lnBlToTr>
-                  </a:tcPr>
-                </a:tc>
-                <a:tc>
-                  <a:txBody>
-                    <a:bodyPr/>
-                    <a:lstStyle/>
-                    <a:p>
-                      <a:pPr algn="ctr" fontAlgn="b"/>
-                      <a:endParaRPr lang="pt-BR" sz="1100" b="0" i="0" u="none" strike="noStrike" dirty="0">
-                        <a:solidFill>
-                          <a:srgbClr val="F94335"/>
-                        </a:solidFill>
-                        <a:latin typeface="Bahnschrift SemiBold SemiConden" panose="020B0502040204020203" pitchFamily="34" charset="0"/>
-                        <a:cs typeface="Arial" pitchFamily="34" charset="0"/>
-                      </a:endParaRPr>
-                    </a:p>
-                  </a:txBody>
-                  <a:tcPr marL="5795" marR="5795" marT="5795" marB="27814" anchor="b">
-                    <a:lnL w="12700" cap="flat" cmpd="sng" algn="ctr">
-                      <a:solidFill>
-                        <a:schemeClr val="bg1"/>
-                      </a:solidFill>
-                      <a:prstDash val="solid"/>
-                      <a:round/>
-                      <a:headEnd type="none" w="med" len="med"/>
-                      <a:tailEnd type="none" w="med" len="med"/>
-                    </a:lnL>
-                    <a:lnR w="12700" cap="flat" cmpd="sng" algn="ctr">
-                      <a:solidFill>
-                        <a:schemeClr val="bg1"/>
-                      </a:solidFill>
-                      <a:prstDash val="solid"/>
-                      <a:round/>
-                      <a:headEnd type="none" w="med" len="med"/>
-                      <a:tailEnd type="none" w="med" len="med"/>
-                    </a:lnR>
-                    <a:lnT w="12700" cap="flat" cmpd="sng" algn="ctr">
-                      <a:solidFill>
-                        <a:schemeClr val="bg1"/>
-                      </a:solidFill>
-                      <a:prstDash val="solid"/>
-                      <a:round/>
-                      <a:headEnd type="none" w="med" len="med"/>
-                      <a:tailEnd type="none" w="med" len="med"/>
-                    </a:lnT>
-                    <a:lnB w="12700" cap="flat" cmpd="sng" algn="ctr">
-                      <a:solidFill>
-                        <a:schemeClr val="bg1"/>
-                      </a:solidFill>
-                      <a:prstDash val="solid"/>
-                      <a:round/>
-                      <a:headEnd type="none" w="med" len="med"/>
-                      <a:tailEnd type="none" w="med" len="med"/>
-                    </a:lnB>
-                    <a:lnTlToBr w="12700" cmpd="sng">
-                      <a:noFill/>
-                      <a:prstDash val="solid"/>
-                    </a:lnTlToBr>
-                    <a:lnBlToTr w="12700" cmpd="sng">
-                      <a:noFill/>
-                      <a:prstDash val="solid"/>
-                    </a:lnBlToTr>
-                  </a:tcPr>
-                </a:tc>
                 <a:extLst>
                   <a:ext uri="{0D108BD9-81ED-4DB2-BD59-A6C34878D82A}">
                     <a16:rowId xmlns:a16="http://schemas.microsoft.com/office/drawing/2014/main" val="10009"/>
@@ -16211,6 +15629,68 @@
                   <a:tcPr marL="5795" marR="5795" marT="5795" marB="27814" anchor="b">
                     <a:lnL w="12700" cmpd="sng">
                       <a:noFill/>
+                    </a:lnL>
+                    <a:lnR w="12700" cap="flat" cmpd="sng" algn="ctr">
+                      <a:solidFill>
+                        <a:schemeClr val="bg1"/>
+                      </a:solidFill>
+                      <a:prstDash val="solid"/>
+                      <a:round/>
+                      <a:headEnd type="none" w="med" len="med"/>
+                      <a:tailEnd type="none" w="med" len="med"/>
+                    </a:lnR>
+                    <a:lnT w="12700" cap="flat" cmpd="sng" algn="ctr">
+                      <a:solidFill>
+                        <a:schemeClr val="bg1"/>
+                      </a:solidFill>
+                      <a:prstDash val="solid"/>
+                      <a:round/>
+                      <a:headEnd type="none" w="med" len="med"/>
+                      <a:tailEnd type="none" w="med" len="med"/>
+                    </a:lnT>
+                    <a:lnB w="12700" cap="flat" cmpd="sng" algn="ctr">
+                      <a:solidFill>
+                        <a:schemeClr val="bg1"/>
+                      </a:solidFill>
+                      <a:prstDash val="solid"/>
+                      <a:round/>
+                      <a:headEnd type="none" w="med" len="med"/>
+                      <a:tailEnd type="none" w="med" len="med"/>
+                    </a:lnB>
+                    <a:lnTlToBr w="12700" cmpd="sng">
+                      <a:noFill/>
+                      <a:prstDash val="solid"/>
+                    </a:lnTlToBr>
+                    <a:lnBlToTr w="12700" cmpd="sng">
+                      <a:noFill/>
+                      <a:prstDash val="solid"/>
+                    </a:lnBlToTr>
+                  </a:tcPr>
+                </a:tc>
+                <a:tc>
+                  <a:txBody>
+                    <a:bodyPr/>
+                    <a:lstStyle/>
+                    <a:p>
+                      <a:pPr algn="ctr" fontAlgn="b"/>
+                      <a:endParaRPr lang="pt-BR" sz="1100" b="0" i="0" u="none" strike="noStrike" dirty="0">
+                        <a:solidFill>
+                          <a:srgbClr val="F94335"/>
+                        </a:solidFill>
+                        <a:latin typeface="Bahnschrift SemiBold SemiConden" panose="020B0502040204020203" pitchFamily="34" charset="0"/>
+                        <a:cs typeface="Arial" pitchFamily="34" charset="0"/>
+                      </a:endParaRPr>
+                    </a:p>
+                  </a:txBody>
+                  <a:tcPr marL="5795" marR="5795" marT="5795" marB="27814" anchor="b">
+                    <a:lnL w="12700" cap="flat" cmpd="sng" algn="ctr">
+                      <a:solidFill>
+                        <a:schemeClr val="bg1"/>
+                      </a:solidFill>
+                      <a:prstDash val="solid"/>
+                      <a:round/>
+                      <a:headEnd type="none" w="med" len="med"/>
+                      <a:tailEnd type="none" w="med" len="med"/>
                     </a:lnL>
                     <a:lnR w="12700" cap="flat" cmpd="sng" algn="ctr">
                       <a:solidFill>
@@ -16402,139 +15882,6 @@
                     </a:lnBlToTr>
                   </a:tcPr>
                 </a:tc>
-                <a:tc>
-                  <a:txBody>
-                    <a:bodyPr/>
-                    <a:lstStyle/>
-                    <a:p>
-                      <a:pPr algn="ctr" fontAlgn="b"/>
-                      <a:r>
-                        <a:rPr lang="pt-BR" sz="1100" u="none" strike="noStrike" dirty="0">
-                          <a:solidFill>
-                            <a:srgbClr val="F94335"/>
-                          </a:solidFill>
-                          <a:latin typeface="Bahnschrift SemiBold SemiConden" panose="020B0502040204020203" pitchFamily="34" charset="0"/>
-                        </a:rPr>
-                        <a:t>13</a:t>
-                      </a:r>
-                      <a:endParaRPr lang="pt-BR" sz="1100" b="0" i="0" u="none" strike="noStrike" dirty="0">
-                        <a:solidFill>
-                          <a:srgbClr val="F94335"/>
-                        </a:solidFill>
-                        <a:latin typeface="Bahnschrift SemiBold SemiConden" panose="020B0502040204020203" pitchFamily="34" charset="0"/>
-                        <a:cs typeface="Arial" pitchFamily="34" charset="0"/>
-                      </a:endParaRPr>
-                    </a:p>
-                  </a:txBody>
-                  <a:tcPr marL="5795" marR="5795" marT="5795" marB="27814" anchor="b">
-                    <a:lnL w="12700" cap="flat" cmpd="sng" algn="ctr">
-                      <a:solidFill>
-                        <a:schemeClr val="bg1"/>
-                      </a:solidFill>
-                      <a:prstDash val="solid"/>
-                      <a:round/>
-                      <a:headEnd type="none" w="med" len="med"/>
-                      <a:tailEnd type="none" w="med" len="med"/>
-                    </a:lnL>
-                    <a:lnR w="12700" cap="flat" cmpd="sng" algn="ctr">
-                      <a:solidFill>
-                        <a:schemeClr val="bg1"/>
-                      </a:solidFill>
-                      <a:prstDash val="solid"/>
-                      <a:round/>
-                      <a:headEnd type="none" w="med" len="med"/>
-                      <a:tailEnd type="none" w="med" len="med"/>
-                    </a:lnR>
-                    <a:lnT w="12700" cap="flat" cmpd="sng" algn="ctr">
-                      <a:solidFill>
-                        <a:schemeClr val="bg1"/>
-                      </a:solidFill>
-                      <a:prstDash val="solid"/>
-                      <a:round/>
-                      <a:headEnd type="none" w="med" len="med"/>
-                      <a:tailEnd type="none" w="med" len="med"/>
-                    </a:lnT>
-                    <a:lnB w="12700" cap="flat" cmpd="sng" algn="ctr">
-                      <a:solidFill>
-                        <a:schemeClr val="bg1"/>
-                      </a:solidFill>
-                      <a:prstDash val="solid"/>
-                      <a:round/>
-                      <a:headEnd type="none" w="med" len="med"/>
-                      <a:tailEnd type="none" w="med" len="med"/>
-                    </a:lnB>
-                    <a:lnTlToBr w="12700" cmpd="sng">
-                      <a:noFill/>
-                      <a:prstDash val="solid"/>
-                    </a:lnTlToBr>
-                    <a:lnBlToTr w="12700" cmpd="sng">
-                      <a:noFill/>
-                      <a:prstDash val="solid"/>
-                    </a:lnBlToTr>
-                  </a:tcPr>
-                </a:tc>
-                <a:tc>
-                  <a:txBody>
-                    <a:bodyPr/>
-                    <a:lstStyle/>
-                    <a:p>
-                      <a:pPr algn="ctr" fontAlgn="b"/>
-                      <a:endParaRPr lang="pt-BR" sz="1100" b="0" i="0" u="none" strike="noStrike" dirty="0">
-                        <a:solidFill>
-                          <a:srgbClr val="F94335"/>
-                        </a:solidFill>
-                        <a:latin typeface="Bahnschrift SemiBold SemiConden" panose="020B0502040204020203" pitchFamily="34" charset="0"/>
-                        <a:cs typeface="Arial" pitchFamily="34" charset="0"/>
-                      </a:endParaRPr>
-                    </a:p>
-                  </a:txBody>
-                  <a:tcPr marL="5795" marR="5795" marT="5795" marB="27814" anchor="b">
-                    <a:lnL w="12700" cap="flat" cmpd="sng" algn="ctr">
-                      <a:solidFill>
-                        <a:schemeClr val="bg1"/>
-                      </a:solidFill>
-                      <a:prstDash val="solid"/>
-                      <a:round/>
-                      <a:headEnd type="none" w="med" len="med"/>
-                      <a:tailEnd type="none" w="med" len="med"/>
-                    </a:lnL>
-                    <a:lnR w="12700" cap="flat" cmpd="sng" algn="ctr">
-                      <a:solidFill>
-                        <a:schemeClr val="bg1"/>
-                      </a:solidFill>
-                      <a:prstDash val="solid"/>
-                      <a:round/>
-                      <a:headEnd type="none" w="med" len="med"/>
-                      <a:tailEnd type="none" w="med" len="med"/>
-                    </a:lnR>
-                    <a:lnT w="12700" cap="flat" cmpd="sng" algn="ctr">
-                      <a:solidFill>
-                        <a:schemeClr val="bg1"/>
-                      </a:solidFill>
-                      <a:prstDash val="solid"/>
-                      <a:round/>
-                      <a:headEnd type="none" w="med" len="med"/>
-                      <a:tailEnd type="none" w="med" len="med"/>
-                    </a:lnT>
-                    <a:lnB w="12700" cap="flat" cmpd="sng" algn="ctr">
-                      <a:solidFill>
-                        <a:schemeClr val="bg1"/>
-                      </a:solidFill>
-                      <a:prstDash val="solid"/>
-                      <a:round/>
-                      <a:headEnd type="none" w="med" len="med"/>
-                      <a:tailEnd type="none" w="med" len="med"/>
-                    </a:lnB>
-                    <a:lnTlToBr w="12700" cmpd="sng">
-                      <a:noFill/>
-                      <a:prstDash val="solid"/>
-                    </a:lnTlToBr>
-                    <a:lnBlToTr w="12700" cmpd="sng">
-                      <a:noFill/>
-                      <a:prstDash val="solid"/>
-                    </a:lnBlToTr>
-                  </a:tcPr>
-                </a:tc>
                 <a:extLst>
                   <a:ext uri="{0D108BD9-81ED-4DB2-BD59-A6C34878D82A}">
                     <a16:rowId xmlns:a16="http://schemas.microsoft.com/office/drawing/2014/main" val="10010"/>
@@ -16563,6 +15910,68 @@
                   <a:tcPr marL="5795" marR="5795" marT="5795" marB="27814" anchor="b">
                     <a:lnL w="12700" cmpd="sng">
                       <a:noFill/>
+                    </a:lnL>
+                    <a:lnR w="12700" cap="flat" cmpd="sng" algn="ctr">
+                      <a:solidFill>
+                        <a:schemeClr val="bg1"/>
+                      </a:solidFill>
+                      <a:prstDash val="solid"/>
+                      <a:round/>
+                      <a:headEnd type="none" w="med" len="med"/>
+                      <a:tailEnd type="none" w="med" len="med"/>
+                    </a:lnR>
+                    <a:lnT w="12700" cap="flat" cmpd="sng" algn="ctr">
+                      <a:solidFill>
+                        <a:schemeClr val="bg1"/>
+                      </a:solidFill>
+                      <a:prstDash val="solid"/>
+                      <a:round/>
+                      <a:headEnd type="none" w="med" len="med"/>
+                      <a:tailEnd type="none" w="med" len="med"/>
+                    </a:lnT>
+                    <a:lnB w="12700" cap="flat" cmpd="sng" algn="ctr">
+                      <a:solidFill>
+                        <a:schemeClr val="bg1"/>
+                      </a:solidFill>
+                      <a:prstDash val="solid"/>
+                      <a:round/>
+                      <a:headEnd type="none" w="med" len="med"/>
+                      <a:tailEnd type="none" w="med" len="med"/>
+                    </a:lnB>
+                    <a:lnTlToBr w="12700" cmpd="sng">
+                      <a:noFill/>
+                      <a:prstDash val="solid"/>
+                    </a:lnTlToBr>
+                    <a:lnBlToTr w="12700" cmpd="sng">
+                      <a:noFill/>
+                      <a:prstDash val="solid"/>
+                    </a:lnBlToTr>
+                  </a:tcPr>
+                </a:tc>
+                <a:tc>
+                  <a:txBody>
+                    <a:bodyPr/>
+                    <a:lstStyle/>
+                    <a:p>
+                      <a:pPr algn="ctr" fontAlgn="b"/>
+                      <a:endParaRPr lang="pt-BR" sz="1100" b="0" i="0" u="none" strike="noStrike" dirty="0">
+                        <a:solidFill>
+                          <a:srgbClr val="F94335"/>
+                        </a:solidFill>
+                        <a:latin typeface="Bahnschrift SemiBold SemiConden" panose="020B0502040204020203" pitchFamily="34" charset="0"/>
+                        <a:cs typeface="Arial" pitchFamily="34" charset="0"/>
+                      </a:endParaRPr>
+                    </a:p>
+                  </a:txBody>
+                  <a:tcPr marL="5795" marR="5795" marT="5795" marB="27814" anchor="b">
+                    <a:lnL w="12700" cap="flat" cmpd="sng" algn="ctr">
+                      <a:solidFill>
+                        <a:schemeClr val="bg1"/>
+                      </a:solidFill>
+                      <a:prstDash val="solid"/>
+                      <a:round/>
+                      <a:headEnd type="none" w="med" len="med"/>
+                      <a:tailEnd type="none" w="med" len="med"/>
                     </a:lnL>
                     <a:lnR w="12700" cap="flat" cmpd="sng" algn="ctr">
                       <a:solidFill>
@@ -16754,139 +16163,6 @@
                     </a:lnBlToTr>
                   </a:tcPr>
                 </a:tc>
-                <a:tc>
-                  <a:txBody>
-                    <a:bodyPr/>
-                    <a:lstStyle/>
-                    <a:p>
-                      <a:pPr algn="ctr" fontAlgn="b"/>
-                      <a:r>
-                        <a:rPr lang="pt-BR" sz="1100" u="none" strike="noStrike" dirty="0">
-                          <a:solidFill>
-                            <a:srgbClr val="F94335"/>
-                          </a:solidFill>
-                          <a:latin typeface="Bahnschrift SemiBold SemiConden" panose="020B0502040204020203" pitchFamily="34" charset="0"/>
-                        </a:rPr>
-                        <a:t>8</a:t>
-                      </a:r>
-                      <a:endParaRPr lang="pt-BR" sz="1100" b="0" i="0" u="none" strike="noStrike" dirty="0">
-                        <a:solidFill>
-                          <a:srgbClr val="F94335"/>
-                        </a:solidFill>
-                        <a:latin typeface="Bahnschrift SemiBold SemiConden" panose="020B0502040204020203" pitchFamily="34" charset="0"/>
-                        <a:cs typeface="Arial" pitchFamily="34" charset="0"/>
-                      </a:endParaRPr>
-                    </a:p>
-                  </a:txBody>
-                  <a:tcPr marL="5795" marR="5795" marT="5795" marB="27814" anchor="b">
-                    <a:lnL w="12700" cap="flat" cmpd="sng" algn="ctr">
-                      <a:solidFill>
-                        <a:schemeClr val="bg1"/>
-                      </a:solidFill>
-                      <a:prstDash val="solid"/>
-                      <a:round/>
-                      <a:headEnd type="none" w="med" len="med"/>
-                      <a:tailEnd type="none" w="med" len="med"/>
-                    </a:lnL>
-                    <a:lnR w="12700" cap="flat" cmpd="sng" algn="ctr">
-                      <a:solidFill>
-                        <a:schemeClr val="bg1"/>
-                      </a:solidFill>
-                      <a:prstDash val="solid"/>
-                      <a:round/>
-                      <a:headEnd type="none" w="med" len="med"/>
-                      <a:tailEnd type="none" w="med" len="med"/>
-                    </a:lnR>
-                    <a:lnT w="12700" cap="flat" cmpd="sng" algn="ctr">
-                      <a:solidFill>
-                        <a:schemeClr val="bg1"/>
-                      </a:solidFill>
-                      <a:prstDash val="solid"/>
-                      <a:round/>
-                      <a:headEnd type="none" w="med" len="med"/>
-                      <a:tailEnd type="none" w="med" len="med"/>
-                    </a:lnT>
-                    <a:lnB w="12700" cap="flat" cmpd="sng" algn="ctr">
-                      <a:solidFill>
-                        <a:schemeClr val="bg1"/>
-                      </a:solidFill>
-                      <a:prstDash val="solid"/>
-                      <a:round/>
-                      <a:headEnd type="none" w="med" len="med"/>
-                      <a:tailEnd type="none" w="med" len="med"/>
-                    </a:lnB>
-                    <a:lnTlToBr w="12700" cmpd="sng">
-                      <a:noFill/>
-                      <a:prstDash val="solid"/>
-                    </a:lnTlToBr>
-                    <a:lnBlToTr w="12700" cmpd="sng">
-                      <a:noFill/>
-                      <a:prstDash val="solid"/>
-                    </a:lnBlToTr>
-                  </a:tcPr>
-                </a:tc>
-                <a:tc>
-                  <a:txBody>
-                    <a:bodyPr/>
-                    <a:lstStyle/>
-                    <a:p>
-                      <a:pPr algn="ctr" fontAlgn="b"/>
-                      <a:endParaRPr lang="pt-BR" sz="1100" b="0" i="0" u="none" strike="noStrike" dirty="0">
-                        <a:solidFill>
-                          <a:srgbClr val="F94335"/>
-                        </a:solidFill>
-                        <a:latin typeface="Bahnschrift SemiBold SemiConden" panose="020B0502040204020203" pitchFamily="34" charset="0"/>
-                        <a:cs typeface="Arial" pitchFamily="34" charset="0"/>
-                      </a:endParaRPr>
-                    </a:p>
-                  </a:txBody>
-                  <a:tcPr marL="5795" marR="5795" marT="5795" marB="27814" anchor="b">
-                    <a:lnL w="12700" cap="flat" cmpd="sng" algn="ctr">
-                      <a:solidFill>
-                        <a:schemeClr val="bg1"/>
-                      </a:solidFill>
-                      <a:prstDash val="solid"/>
-                      <a:round/>
-                      <a:headEnd type="none" w="med" len="med"/>
-                      <a:tailEnd type="none" w="med" len="med"/>
-                    </a:lnL>
-                    <a:lnR w="12700" cap="flat" cmpd="sng" algn="ctr">
-                      <a:solidFill>
-                        <a:schemeClr val="bg1"/>
-                      </a:solidFill>
-                      <a:prstDash val="solid"/>
-                      <a:round/>
-                      <a:headEnd type="none" w="med" len="med"/>
-                      <a:tailEnd type="none" w="med" len="med"/>
-                    </a:lnR>
-                    <a:lnT w="12700" cap="flat" cmpd="sng" algn="ctr">
-                      <a:solidFill>
-                        <a:schemeClr val="bg1"/>
-                      </a:solidFill>
-                      <a:prstDash val="solid"/>
-                      <a:round/>
-                      <a:headEnd type="none" w="med" len="med"/>
-                      <a:tailEnd type="none" w="med" len="med"/>
-                    </a:lnT>
-                    <a:lnB w="12700" cap="flat" cmpd="sng" algn="ctr">
-                      <a:solidFill>
-                        <a:schemeClr val="bg1"/>
-                      </a:solidFill>
-                      <a:prstDash val="solid"/>
-                      <a:round/>
-                      <a:headEnd type="none" w="med" len="med"/>
-                      <a:tailEnd type="none" w="med" len="med"/>
-                    </a:lnB>
-                    <a:lnTlToBr w="12700" cmpd="sng">
-                      <a:noFill/>
-                      <a:prstDash val="solid"/>
-                    </a:lnTlToBr>
-                    <a:lnBlToTr w="12700" cmpd="sng">
-                      <a:noFill/>
-                      <a:prstDash val="solid"/>
-                    </a:lnBlToTr>
-                  </a:tcPr>
-                </a:tc>
                 <a:extLst>
                   <a:ext uri="{0D108BD9-81ED-4DB2-BD59-A6C34878D82A}">
                     <a16:rowId xmlns:a16="http://schemas.microsoft.com/office/drawing/2014/main" val="10011"/>
@@ -16921,6 +16197,68 @@
                   <a:tcPr marL="5795" marR="5795" marT="5795" marB="27814" anchor="b">
                     <a:lnL w="12700" cmpd="sng">
                       <a:noFill/>
+                    </a:lnL>
+                    <a:lnR w="12700" cap="flat" cmpd="sng" algn="ctr">
+                      <a:solidFill>
+                        <a:schemeClr val="bg1"/>
+                      </a:solidFill>
+                      <a:prstDash val="solid"/>
+                      <a:round/>
+                      <a:headEnd type="none" w="med" len="med"/>
+                      <a:tailEnd type="none" w="med" len="med"/>
+                    </a:lnR>
+                    <a:lnT w="12700" cap="flat" cmpd="sng" algn="ctr">
+                      <a:solidFill>
+                        <a:schemeClr val="bg1"/>
+                      </a:solidFill>
+                      <a:prstDash val="solid"/>
+                      <a:round/>
+                      <a:headEnd type="none" w="med" len="med"/>
+                      <a:tailEnd type="none" w="med" len="med"/>
+                    </a:lnT>
+                    <a:lnB w="12700" cap="flat" cmpd="sng" algn="ctr">
+                      <a:solidFill>
+                        <a:schemeClr val="bg1"/>
+                      </a:solidFill>
+                      <a:prstDash val="solid"/>
+                      <a:round/>
+                      <a:headEnd type="none" w="med" len="med"/>
+                      <a:tailEnd type="none" w="med" len="med"/>
+                    </a:lnB>
+                    <a:lnTlToBr w="12700" cmpd="sng">
+                      <a:noFill/>
+                      <a:prstDash val="solid"/>
+                    </a:lnTlToBr>
+                    <a:lnBlToTr w="12700" cmpd="sng">
+                      <a:noFill/>
+                      <a:prstDash val="solid"/>
+                    </a:lnBlToTr>
+                  </a:tcPr>
+                </a:tc>
+                <a:tc>
+                  <a:txBody>
+                    <a:bodyPr/>
+                    <a:lstStyle/>
+                    <a:p>
+                      <a:pPr algn="ctr" fontAlgn="b"/>
+                      <a:endParaRPr lang="pt-BR" sz="1100" b="0" i="0" u="none" strike="noStrike" dirty="0">
+                        <a:solidFill>
+                          <a:srgbClr val="F94335"/>
+                        </a:solidFill>
+                        <a:latin typeface="Bahnschrift SemiBold SemiConden" panose="020B0502040204020203" pitchFamily="34" charset="0"/>
+                        <a:cs typeface="Arial" pitchFamily="34" charset="0"/>
+                      </a:endParaRPr>
+                    </a:p>
+                  </a:txBody>
+                  <a:tcPr marL="5795" marR="5795" marT="5795" marB="27814" anchor="b">
+                    <a:lnL w="12700" cap="flat" cmpd="sng" algn="ctr">
+                      <a:solidFill>
+                        <a:schemeClr val="bg1"/>
+                      </a:solidFill>
+                      <a:prstDash val="solid"/>
+                      <a:round/>
+                      <a:headEnd type="none" w="med" len="med"/>
+                      <a:tailEnd type="none" w="med" len="med"/>
                     </a:lnL>
                     <a:lnR w="12700" cap="flat" cmpd="sng" algn="ctr">
                       <a:solidFill>
@@ -17112,133 +16450,6 @@
                     </a:lnBlToTr>
                   </a:tcPr>
                 </a:tc>
-                <a:tc>
-                  <a:txBody>
-                    <a:bodyPr/>
-                    <a:lstStyle/>
-                    <a:p>
-                      <a:pPr algn="ctr" fontAlgn="b"/>
-                      <a:r>
-                        <a:rPr lang="pt-BR" sz="1100" b="0" i="0" u="none" strike="noStrike" dirty="0">
-                          <a:solidFill>
-                            <a:srgbClr val="F94335"/>
-                          </a:solidFill>
-                          <a:latin typeface="Bahnschrift SemiBold SemiConden" panose="020B0502040204020203" pitchFamily="34" charset="0"/>
-                          <a:cs typeface="Arial" pitchFamily="34" charset="0"/>
-                        </a:rPr>
-                        <a:t>8</a:t>
-                      </a:r>
-                    </a:p>
-                  </a:txBody>
-                  <a:tcPr marL="5795" marR="5795" marT="5795" marB="27814" anchor="b">
-                    <a:lnL w="12700" cap="flat" cmpd="sng" algn="ctr">
-                      <a:solidFill>
-                        <a:schemeClr val="bg1"/>
-                      </a:solidFill>
-                      <a:prstDash val="solid"/>
-                      <a:round/>
-                      <a:headEnd type="none" w="med" len="med"/>
-                      <a:tailEnd type="none" w="med" len="med"/>
-                    </a:lnL>
-                    <a:lnR w="12700" cap="flat" cmpd="sng" algn="ctr">
-                      <a:solidFill>
-                        <a:schemeClr val="bg1"/>
-                      </a:solidFill>
-                      <a:prstDash val="solid"/>
-                      <a:round/>
-                      <a:headEnd type="none" w="med" len="med"/>
-                      <a:tailEnd type="none" w="med" len="med"/>
-                    </a:lnR>
-                    <a:lnT w="12700" cap="flat" cmpd="sng" algn="ctr">
-                      <a:solidFill>
-                        <a:schemeClr val="bg1"/>
-                      </a:solidFill>
-                      <a:prstDash val="solid"/>
-                      <a:round/>
-                      <a:headEnd type="none" w="med" len="med"/>
-                      <a:tailEnd type="none" w="med" len="med"/>
-                    </a:lnT>
-                    <a:lnB w="12700" cap="flat" cmpd="sng" algn="ctr">
-                      <a:solidFill>
-                        <a:schemeClr val="bg1"/>
-                      </a:solidFill>
-                      <a:prstDash val="solid"/>
-                      <a:round/>
-                      <a:headEnd type="none" w="med" len="med"/>
-                      <a:tailEnd type="none" w="med" len="med"/>
-                    </a:lnB>
-                    <a:lnTlToBr w="12700" cmpd="sng">
-                      <a:noFill/>
-                      <a:prstDash val="solid"/>
-                    </a:lnTlToBr>
-                    <a:lnBlToTr w="12700" cmpd="sng">
-                      <a:noFill/>
-                      <a:prstDash val="solid"/>
-                    </a:lnBlToTr>
-                  </a:tcPr>
-                </a:tc>
-                <a:tc>
-                  <a:txBody>
-                    <a:bodyPr/>
-                    <a:lstStyle/>
-                    <a:p>
-                      <a:pPr algn="ctr" fontAlgn="b"/>
-                      <a:endParaRPr lang="pt-BR" sz="1100" b="0" i="0" u="none" strike="noStrike" dirty="0">
-                        <a:solidFill>
-                          <a:srgbClr val="F94335"/>
-                        </a:solidFill>
-                        <a:latin typeface="Bahnschrift SemiBold SemiConden" panose="020B0502040204020203" pitchFamily="34" charset="0"/>
-                        <a:cs typeface="Arial" pitchFamily="34" charset="0"/>
-                      </a:endParaRPr>
-                    </a:p>
-                  </a:txBody>
-                  <a:tcPr marL="5795" marR="5795" marT="5795" marB="27814" anchor="b">
-                    <a:lnL w="12700" cap="flat" cmpd="sng" algn="ctr">
-                      <a:solidFill>
-                        <a:schemeClr val="bg1"/>
-                      </a:solidFill>
-                      <a:prstDash val="solid"/>
-                      <a:round/>
-                      <a:headEnd type="none" w="med" len="med"/>
-                      <a:tailEnd type="none" w="med" len="med"/>
-                    </a:lnL>
-                    <a:lnR w="12700" cap="flat" cmpd="sng" algn="ctr">
-                      <a:solidFill>
-                        <a:schemeClr val="bg1"/>
-                      </a:solidFill>
-                      <a:prstDash val="solid"/>
-                      <a:round/>
-                      <a:headEnd type="none" w="med" len="med"/>
-                      <a:tailEnd type="none" w="med" len="med"/>
-                    </a:lnR>
-                    <a:lnT w="12700" cap="flat" cmpd="sng" algn="ctr">
-                      <a:solidFill>
-                        <a:schemeClr val="bg1"/>
-                      </a:solidFill>
-                      <a:prstDash val="solid"/>
-                      <a:round/>
-                      <a:headEnd type="none" w="med" len="med"/>
-                      <a:tailEnd type="none" w="med" len="med"/>
-                    </a:lnT>
-                    <a:lnB w="12700" cap="flat" cmpd="sng" algn="ctr">
-                      <a:solidFill>
-                        <a:schemeClr val="bg1"/>
-                      </a:solidFill>
-                      <a:prstDash val="solid"/>
-                      <a:round/>
-                      <a:headEnd type="none" w="med" len="med"/>
-                      <a:tailEnd type="none" w="med" len="med"/>
-                    </a:lnB>
-                    <a:lnTlToBr w="12700" cmpd="sng">
-                      <a:noFill/>
-                      <a:prstDash val="solid"/>
-                    </a:lnTlToBr>
-                    <a:lnBlToTr w="12700" cmpd="sng">
-                      <a:noFill/>
-                      <a:prstDash val="solid"/>
-                    </a:lnBlToTr>
-                  </a:tcPr>
-                </a:tc>
                 <a:extLst>
                   <a:ext uri="{0D108BD9-81ED-4DB2-BD59-A6C34878D82A}">
                     <a16:rowId xmlns:a16="http://schemas.microsoft.com/office/drawing/2014/main" val="10012"/>
@@ -17273,6 +16484,84 @@
                   <a:tcPr marL="5795" marR="5795" marT="5795" marB="27814" anchor="b">
                     <a:lnL w="12700" cmpd="sng">
                       <a:noFill/>
+                    </a:lnL>
+                    <a:lnR w="12700" cap="flat" cmpd="sng" algn="ctr">
+                      <a:solidFill>
+                        <a:schemeClr val="bg1"/>
+                      </a:solidFill>
+                      <a:prstDash val="solid"/>
+                      <a:round/>
+                      <a:headEnd type="none" w="med" len="med"/>
+                      <a:tailEnd type="none" w="med" len="med"/>
+                    </a:lnR>
+                    <a:lnT w="12700" cap="flat" cmpd="sng" algn="ctr">
+                      <a:solidFill>
+                        <a:schemeClr val="bg1"/>
+                      </a:solidFill>
+                      <a:prstDash val="solid"/>
+                      <a:round/>
+                      <a:headEnd type="none" w="med" len="med"/>
+                      <a:tailEnd type="none" w="med" len="med"/>
+                    </a:lnT>
+                    <a:lnB w="12700" cap="flat" cmpd="sng" algn="ctr">
+                      <a:solidFill>
+                        <a:schemeClr val="bg1"/>
+                      </a:solidFill>
+                      <a:prstDash val="solid"/>
+                      <a:round/>
+                      <a:headEnd type="none" w="med" len="med"/>
+                      <a:tailEnd type="none" w="med" len="med"/>
+                    </a:lnB>
+                    <a:lnTlToBr w="12700" cmpd="sng">
+                      <a:noFill/>
+                      <a:prstDash val="solid"/>
+                    </a:lnTlToBr>
+                    <a:lnBlToTr w="12700" cmpd="sng">
+                      <a:noFill/>
+                      <a:prstDash val="solid"/>
+                    </a:lnBlToTr>
+                  </a:tcPr>
+                </a:tc>
+                <a:tc>
+                  <a:txBody>
+                    <a:bodyPr/>
+                    <a:lstStyle/>
+                    <a:p>
+                      <a:pPr marL="0" marR="0" lvl="0" indent="0" algn="ctr" defTabSz="914400" rtl="0" eaLnBrk="1" fontAlgn="b" latinLnBrk="0" hangingPunct="1">
+                        <a:lnSpc>
+                          <a:spcPct val="100000"/>
+                        </a:lnSpc>
+                        <a:spcBef>
+                          <a:spcPts val="0"/>
+                        </a:spcBef>
+                        <a:spcAft>
+                          <a:spcPts val="0"/>
+                        </a:spcAft>
+                        <a:buClrTx/>
+                        <a:buSzTx/>
+                        <a:buFontTx/>
+                        <a:buNone/>
+                        <a:tabLst/>
+                        <a:defRPr/>
+                      </a:pPr>
+                      <a:endParaRPr lang="pt-BR" sz="1100" b="0" i="0" u="none" strike="noStrike" dirty="0">
+                        <a:solidFill>
+                          <a:srgbClr val="F94335"/>
+                        </a:solidFill>
+                        <a:latin typeface="Bahnschrift SemiBold SemiConden" panose="020B0502040204020203" pitchFamily="34" charset="0"/>
+                        <a:cs typeface="Arial" pitchFamily="34" charset="0"/>
+                      </a:endParaRPr>
+                    </a:p>
+                  </a:txBody>
+                  <a:tcPr marL="5795" marR="5795" marT="5795" marB="27814" anchor="b">
+                    <a:lnL w="12700" cap="flat" cmpd="sng" algn="ctr">
+                      <a:solidFill>
+                        <a:schemeClr val="bg1"/>
+                      </a:solidFill>
+                      <a:prstDash val="solid"/>
+                      <a:round/>
+                      <a:headEnd type="none" w="med" len="med"/>
+                      <a:tailEnd type="none" w="med" len="med"/>
                     </a:lnL>
                     <a:lnR w="12700" cap="flat" cmpd="sng" algn="ctr">
                       <a:solidFill>
@@ -17480,133 +16769,6 @@
                     </a:lnBlToTr>
                   </a:tcPr>
                 </a:tc>
-                <a:tc>
-                  <a:txBody>
-                    <a:bodyPr/>
-                    <a:lstStyle/>
-                    <a:p>
-                      <a:pPr algn="ctr" fontAlgn="b"/>
-                      <a:r>
-                        <a:rPr lang="pt-BR" sz="1100" b="0" i="0" u="none" strike="noStrike" dirty="0">
-                          <a:solidFill>
-                            <a:srgbClr val="F94335"/>
-                          </a:solidFill>
-                          <a:latin typeface="Bahnschrift SemiBold SemiConden" panose="020B0502040204020203" pitchFamily="34" charset="0"/>
-                          <a:cs typeface="Arial" pitchFamily="34" charset="0"/>
-                        </a:rPr>
-                        <a:t>8</a:t>
-                      </a:r>
-                    </a:p>
-                  </a:txBody>
-                  <a:tcPr marL="5795" marR="5795" marT="5795" marB="27814" anchor="b">
-                    <a:lnL w="12700" cap="flat" cmpd="sng" algn="ctr">
-                      <a:solidFill>
-                        <a:schemeClr val="bg1"/>
-                      </a:solidFill>
-                      <a:prstDash val="solid"/>
-                      <a:round/>
-                      <a:headEnd type="none" w="med" len="med"/>
-                      <a:tailEnd type="none" w="med" len="med"/>
-                    </a:lnL>
-                    <a:lnR w="12700" cap="flat" cmpd="sng" algn="ctr">
-                      <a:solidFill>
-                        <a:schemeClr val="bg1"/>
-                      </a:solidFill>
-                      <a:prstDash val="solid"/>
-                      <a:round/>
-                      <a:headEnd type="none" w="med" len="med"/>
-                      <a:tailEnd type="none" w="med" len="med"/>
-                    </a:lnR>
-                    <a:lnT w="12700" cap="flat" cmpd="sng" algn="ctr">
-                      <a:solidFill>
-                        <a:schemeClr val="bg1"/>
-                      </a:solidFill>
-                      <a:prstDash val="solid"/>
-                      <a:round/>
-                      <a:headEnd type="none" w="med" len="med"/>
-                      <a:tailEnd type="none" w="med" len="med"/>
-                    </a:lnT>
-                    <a:lnB w="12700" cap="flat" cmpd="sng" algn="ctr">
-                      <a:solidFill>
-                        <a:schemeClr val="bg1"/>
-                      </a:solidFill>
-                      <a:prstDash val="solid"/>
-                      <a:round/>
-                      <a:headEnd type="none" w="med" len="med"/>
-                      <a:tailEnd type="none" w="med" len="med"/>
-                    </a:lnB>
-                    <a:lnTlToBr w="12700" cmpd="sng">
-                      <a:noFill/>
-                      <a:prstDash val="solid"/>
-                    </a:lnTlToBr>
-                    <a:lnBlToTr w="12700" cmpd="sng">
-                      <a:noFill/>
-                      <a:prstDash val="solid"/>
-                    </a:lnBlToTr>
-                  </a:tcPr>
-                </a:tc>
-                <a:tc>
-                  <a:txBody>
-                    <a:bodyPr/>
-                    <a:lstStyle/>
-                    <a:p>
-                      <a:pPr algn="ctr" fontAlgn="b"/>
-                      <a:endParaRPr lang="pt-BR" sz="1100" b="0" i="0" u="none" strike="noStrike" dirty="0">
-                        <a:solidFill>
-                          <a:srgbClr val="F94335"/>
-                        </a:solidFill>
-                        <a:latin typeface="Bahnschrift SemiBold SemiConden" panose="020B0502040204020203" pitchFamily="34" charset="0"/>
-                        <a:cs typeface="Arial" pitchFamily="34" charset="0"/>
-                      </a:endParaRPr>
-                    </a:p>
-                  </a:txBody>
-                  <a:tcPr marL="5795" marR="5795" marT="5795" marB="27814" anchor="b">
-                    <a:lnL w="12700" cap="flat" cmpd="sng" algn="ctr">
-                      <a:solidFill>
-                        <a:schemeClr val="bg1"/>
-                      </a:solidFill>
-                      <a:prstDash val="solid"/>
-                      <a:round/>
-                      <a:headEnd type="none" w="med" len="med"/>
-                      <a:tailEnd type="none" w="med" len="med"/>
-                    </a:lnL>
-                    <a:lnR w="12700" cap="flat" cmpd="sng" algn="ctr">
-                      <a:solidFill>
-                        <a:schemeClr val="bg1"/>
-                      </a:solidFill>
-                      <a:prstDash val="solid"/>
-                      <a:round/>
-                      <a:headEnd type="none" w="med" len="med"/>
-                      <a:tailEnd type="none" w="med" len="med"/>
-                    </a:lnR>
-                    <a:lnT w="12700" cap="flat" cmpd="sng" algn="ctr">
-                      <a:solidFill>
-                        <a:schemeClr val="bg1"/>
-                      </a:solidFill>
-                      <a:prstDash val="solid"/>
-                      <a:round/>
-                      <a:headEnd type="none" w="med" len="med"/>
-                      <a:tailEnd type="none" w="med" len="med"/>
-                    </a:lnT>
-                    <a:lnB w="12700" cap="flat" cmpd="sng" algn="ctr">
-                      <a:solidFill>
-                        <a:schemeClr val="bg1"/>
-                      </a:solidFill>
-                      <a:prstDash val="solid"/>
-                      <a:round/>
-                      <a:headEnd type="none" w="med" len="med"/>
-                      <a:tailEnd type="none" w="med" len="med"/>
-                    </a:lnB>
-                    <a:lnTlToBr w="12700" cmpd="sng">
-                      <a:noFill/>
-                      <a:prstDash val="solid"/>
-                    </a:lnTlToBr>
-                    <a:lnBlToTr w="12700" cmpd="sng">
-                      <a:noFill/>
-                      <a:prstDash val="solid"/>
-                    </a:lnBlToTr>
-                  </a:tcPr>
-                </a:tc>
                 <a:extLst>
                   <a:ext uri="{0D108BD9-81ED-4DB2-BD59-A6C34878D82A}">
                     <a16:rowId xmlns:a16="http://schemas.microsoft.com/office/drawing/2014/main" val="10013"/>
@@ -17641,6 +16803,84 @@
                   <a:tcPr marL="5795" marR="5795" marT="5795" marB="27814" anchor="b">
                     <a:lnL w="12700" cmpd="sng">
                       <a:noFill/>
+                    </a:lnL>
+                    <a:lnR w="12700" cap="flat" cmpd="sng" algn="ctr">
+                      <a:solidFill>
+                        <a:schemeClr val="bg1"/>
+                      </a:solidFill>
+                      <a:prstDash val="solid"/>
+                      <a:round/>
+                      <a:headEnd type="none" w="med" len="med"/>
+                      <a:tailEnd type="none" w="med" len="med"/>
+                    </a:lnR>
+                    <a:lnT w="12700" cap="flat" cmpd="sng" algn="ctr">
+                      <a:solidFill>
+                        <a:schemeClr val="bg1"/>
+                      </a:solidFill>
+                      <a:prstDash val="solid"/>
+                      <a:round/>
+                      <a:headEnd type="none" w="med" len="med"/>
+                      <a:tailEnd type="none" w="med" len="med"/>
+                    </a:lnT>
+                    <a:lnB w="12700" cap="flat" cmpd="sng" algn="ctr">
+                      <a:solidFill>
+                        <a:schemeClr val="bg1"/>
+                      </a:solidFill>
+                      <a:prstDash val="solid"/>
+                      <a:round/>
+                      <a:headEnd type="none" w="med" len="med"/>
+                      <a:tailEnd type="none" w="med" len="med"/>
+                    </a:lnB>
+                    <a:lnTlToBr w="12700" cmpd="sng">
+                      <a:noFill/>
+                      <a:prstDash val="solid"/>
+                    </a:lnTlToBr>
+                    <a:lnBlToTr w="12700" cmpd="sng">
+                      <a:noFill/>
+                      <a:prstDash val="solid"/>
+                    </a:lnBlToTr>
+                  </a:tcPr>
+                </a:tc>
+                <a:tc>
+                  <a:txBody>
+                    <a:bodyPr/>
+                    <a:lstStyle/>
+                    <a:p>
+                      <a:pPr marL="0" marR="0" lvl="0" indent="0" algn="ctr" defTabSz="914400" rtl="0" eaLnBrk="1" fontAlgn="b" latinLnBrk="0" hangingPunct="1">
+                        <a:lnSpc>
+                          <a:spcPct val="100000"/>
+                        </a:lnSpc>
+                        <a:spcBef>
+                          <a:spcPts val="0"/>
+                        </a:spcBef>
+                        <a:spcAft>
+                          <a:spcPts val="0"/>
+                        </a:spcAft>
+                        <a:buClrTx/>
+                        <a:buSzTx/>
+                        <a:buFontTx/>
+                        <a:buNone/>
+                        <a:tabLst/>
+                        <a:defRPr/>
+                      </a:pPr>
+                      <a:endParaRPr lang="pt-BR" sz="1100" b="0" i="0" u="none" strike="noStrike" dirty="0">
+                        <a:solidFill>
+                          <a:srgbClr val="F94335"/>
+                        </a:solidFill>
+                        <a:latin typeface="Bahnschrift SemiBold SemiConden" panose="020B0502040204020203" pitchFamily="34" charset="0"/>
+                        <a:cs typeface="Arial" pitchFamily="34" charset="0"/>
+                      </a:endParaRPr>
+                    </a:p>
+                  </a:txBody>
+                  <a:tcPr marL="5795" marR="5795" marT="5795" marB="27814" anchor="b">
+                    <a:lnL w="12700" cap="flat" cmpd="sng" algn="ctr">
+                      <a:solidFill>
+                        <a:schemeClr val="bg1"/>
+                      </a:solidFill>
+                      <a:prstDash val="solid"/>
+                      <a:round/>
+                      <a:headEnd type="none" w="med" len="med"/>
+                      <a:tailEnd type="none" w="med" len="med"/>
                     </a:lnL>
                     <a:lnR w="12700" cap="flat" cmpd="sng" algn="ctr">
                       <a:solidFill>
@@ -17848,133 +17088,6 @@
                     </a:lnBlToTr>
                   </a:tcPr>
                 </a:tc>
-                <a:tc>
-                  <a:txBody>
-                    <a:bodyPr/>
-                    <a:lstStyle/>
-                    <a:p>
-                      <a:pPr algn="ctr" fontAlgn="b"/>
-                      <a:r>
-                        <a:rPr lang="pt-BR" sz="1100" b="0" i="0" u="none" strike="noStrike" dirty="0">
-                          <a:solidFill>
-                            <a:srgbClr val="F94335"/>
-                          </a:solidFill>
-                          <a:latin typeface="Bahnschrift SemiBold SemiConden" panose="020B0502040204020203" pitchFamily="34" charset="0"/>
-                          <a:cs typeface="Arial" pitchFamily="34" charset="0"/>
-                        </a:rPr>
-                        <a:t>8</a:t>
-                      </a:r>
-                    </a:p>
-                  </a:txBody>
-                  <a:tcPr marL="5795" marR="5795" marT="5795" marB="27814" anchor="b">
-                    <a:lnL w="12700" cap="flat" cmpd="sng" algn="ctr">
-                      <a:solidFill>
-                        <a:schemeClr val="bg1"/>
-                      </a:solidFill>
-                      <a:prstDash val="solid"/>
-                      <a:round/>
-                      <a:headEnd type="none" w="med" len="med"/>
-                      <a:tailEnd type="none" w="med" len="med"/>
-                    </a:lnL>
-                    <a:lnR w="12700" cap="flat" cmpd="sng" algn="ctr">
-                      <a:solidFill>
-                        <a:schemeClr val="bg1"/>
-                      </a:solidFill>
-                      <a:prstDash val="solid"/>
-                      <a:round/>
-                      <a:headEnd type="none" w="med" len="med"/>
-                      <a:tailEnd type="none" w="med" len="med"/>
-                    </a:lnR>
-                    <a:lnT w="12700" cap="flat" cmpd="sng" algn="ctr">
-                      <a:solidFill>
-                        <a:schemeClr val="bg1"/>
-                      </a:solidFill>
-                      <a:prstDash val="solid"/>
-                      <a:round/>
-                      <a:headEnd type="none" w="med" len="med"/>
-                      <a:tailEnd type="none" w="med" len="med"/>
-                    </a:lnT>
-                    <a:lnB w="12700" cap="flat" cmpd="sng" algn="ctr">
-                      <a:solidFill>
-                        <a:schemeClr val="bg1"/>
-                      </a:solidFill>
-                      <a:prstDash val="solid"/>
-                      <a:round/>
-                      <a:headEnd type="none" w="med" len="med"/>
-                      <a:tailEnd type="none" w="med" len="med"/>
-                    </a:lnB>
-                    <a:lnTlToBr w="12700" cmpd="sng">
-                      <a:noFill/>
-                      <a:prstDash val="solid"/>
-                    </a:lnTlToBr>
-                    <a:lnBlToTr w="12700" cmpd="sng">
-                      <a:noFill/>
-                      <a:prstDash val="solid"/>
-                    </a:lnBlToTr>
-                  </a:tcPr>
-                </a:tc>
-                <a:tc>
-                  <a:txBody>
-                    <a:bodyPr/>
-                    <a:lstStyle/>
-                    <a:p>
-                      <a:pPr algn="ctr" fontAlgn="b"/>
-                      <a:endParaRPr lang="pt-BR" sz="1100" b="0" i="0" u="none" strike="noStrike" dirty="0">
-                        <a:solidFill>
-                          <a:srgbClr val="F94335"/>
-                        </a:solidFill>
-                        <a:latin typeface="Bahnschrift SemiBold SemiConden" panose="020B0502040204020203" pitchFamily="34" charset="0"/>
-                        <a:cs typeface="Arial" pitchFamily="34" charset="0"/>
-                      </a:endParaRPr>
-                    </a:p>
-                  </a:txBody>
-                  <a:tcPr marL="5795" marR="5795" marT="5795" marB="27814" anchor="b">
-                    <a:lnL w="12700" cap="flat" cmpd="sng" algn="ctr">
-                      <a:solidFill>
-                        <a:schemeClr val="bg1"/>
-                      </a:solidFill>
-                      <a:prstDash val="solid"/>
-                      <a:round/>
-                      <a:headEnd type="none" w="med" len="med"/>
-                      <a:tailEnd type="none" w="med" len="med"/>
-                    </a:lnL>
-                    <a:lnR w="12700" cap="flat" cmpd="sng" algn="ctr">
-                      <a:solidFill>
-                        <a:schemeClr val="bg1"/>
-                      </a:solidFill>
-                      <a:prstDash val="solid"/>
-                      <a:round/>
-                      <a:headEnd type="none" w="med" len="med"/>
-                      <a:tailEnd type="none" w="med" len="med"/>
-                    </a:lnR>
-                    <a:lnT w="12700" cap="flat" cmpd="sng" algn="ctr">
-                      <a:solidFill>
-                        <a:schemeClr val="bg1"/>
-                      </a:solidFill>
-                      <a:prstDash val="solid"/>
-                      <a:round/>
-                      <a:headEnd type="none" w="med" len="med"/>
-                      <a:tailEnd type="none" w="med" len="med"/>
-                    </a:lnT>
-                    <a:lnB w="12700" cap="flat" cmpd="sng" algn="ctr">
-                      <a:solidFill>
-                        <a:schemeClr val="bg1"/>
-                      </a:solidFill>
-                      <a:prstDash val="solid"/>
-                      <a:round/>
-                      <a:headEnd type="none" w="med" len="med"/>
-                      <a:tailEnd type="none" w="med" len="med"/>
-                    </a:lnB>
-                    <a:lnTlToBr w="12700" cmpd="sng">
-                      <a:noFill/>
-                      <a:prstDash val="solid"/>
-                    </a:lnTlToBr>
-                    <a:lnBlToTr w="12700" cmpd="sng">
-                      <a:noFill/>
-                      <a:prstDash val="solid"/>
-                    </a:lnBlToTr>
-                  </a:tcPr>
-                </a:tc>
                 <a:extLst>
                   <a:ext uri="{0D108BD9-81ED-4DB2-BD59-A6C34878D82A}">
                     <a16:rowId xmlns:a16="http://schemas.microsoft.com/office/drawing/2014/main" val="10014"/>
@@ -18053,6 +17166,68 @@
                     <a:lstStyle/>
                     <a:p>
                       <a:pPr algn="ctr" fontAlgn="b"/>
+                      <a:endParaRPr lang="pt-BR" sz="1100" b="0" i="0" u="none" strike="noStrike" baseline="0" dirty="0" smtClean="0">
+                        <a:solidFill>
+                          <a:srgbClr val="F94335"/>
+                        </a:solidFill>
+                        <a:latin typeface="Bahnschrift SemiBold SemiConden" panose="020B0502040204020203" pitchFamily="34" charset="0"/>
+                        <a:cs typeface="Arial" pitchFamily="34" charset="0"/>
+                      </a:endParaRPr>
+                    </a:p>
+                  </a:txBody>
+                  <a:tcPr marL="5795" marR="5795" marT="5795" marB="27814" anchor="b">
+                    <a:lnL w="12700" cap="flat" cmpd="sng" algn="ctr">
+                      <a:solidFill>
+                        <a:schemeClr val="bg1"/>
+                      </a:solidFill>
+                      <a:prstDash val="solid"/>
+                      <a:round/>
+                      <a:headEnd type="none" w="med" len="med"/>
+                      <a:tailEnd type="none" w="med" len="med"/>
+                    </a:lnL>
+                    <a:lnR w="12700" cap="flat" cmpd="sng" algn="ctr">
+                      <a:solidFill>
+                        <a:schemeClr val="bg1"/>
+                      </a:solidFill>
+                      <a:prstDash val="solid"/>
+                      <a:round/>
+                      <a:headEnd type="none" w="med" len="med"/>
+                      <a:tailEnd type="none" w="med" len="med"/>
+                    </a:lnR>
+                    <a:lnT w="12700" cap="flat" cmpd="sng" algn="ctr">
+                      <a:solidFill>
+                        <a:schemeClr val="bg1"/>
+                      </a:solidFill>
+                      <a:prstDash val="solid"/>
+                      <a:round/>
+                      <a:headEnd type="none" w="med" len="med"/>
+                      <a:tailEnd type="none" w="med" len="med"/>
+                    </a:lnT>
+                    <a:lnB w="12700" cap="flat" cmpd="sng" algn="ctr">
+                      <a:solidFill>
+                        <a:schemeClr val="bg1"/>
+                      </a:solidFill>
+                      <a:prstDash val="solid"/>
+                      <a:round/>
+                      <a:headEnd type="none" w="med" len="med"/>
+                      <a:tailEnd type="none" w="med" len="med"/>
+                    </a:lnB>
+                    <a:lnTlToBr w="12700" cmpd="sng">
+                      <a:noFill/>
+                      <a:prstDash val="solid"/>
+                    </a:lnTlToBr>
+                    <a:lnBlToTr w="12700" cmpd="sng">
+                      <a:noFill/>
+                      <a:prstDash val="solid"/>
+                    </a:lnBlToTr>
+                  </a:tcPr>
+                </a:tc>
+                <a:tc>
+                  <a:txBody>
+                    <a:bodyPr/>
+                    <a:lstStyle/>
+                    <a:p>
+                      <a:pPr algn="ctr" fontAlgn="b"/>
                       <a:r>
                         <a:rPr lang="pt-BR" sz="1100" b="0" i="0" u="none" strike="noStrike" dirty="0" smtClean="0">
                           <a:solidFill>
@@ -18193,133 +17368,6 @@
                     </a:lnBlToTr>
                   </a:tcPr>
                 </a:tc>
-                <a:tc>
-                  <a:txBody>
-                    <a:bodyPr/>
-                    <a:lstStyle/>
-                    <a:p>
-                      <a:pPr algn="ctr" fontAlgn="b"/>
-                      <a:r>
-                        <a:rPr lang="pt-BR" sz="1100" b="0" i="0" u="none" strike="noStrike" dirty="0">
-                          <a:solidFill>
-                            <a:srgbClr val="F94335"/>
-                          </a:solidFill>
-                          <a:latin typeface="Bahnschrift SemiBold SemiConden" panose="020B0502040204020203" pitchFamily="34" charset="0"/>
-                          <a:cs typeface="Arial" pitchFamily="34" charset="0"/>
-                        </a:rPr>
-                        <a:t>13</a:t>
-                      </a:r>
-                    </a:p>
-                  </a:txBody>
-                  <a:tcPr marL="5795" marR="5795" marT="5795" marB="27814" anchor="b">
-                    <a:lnL w="12700" cap="flat" cmpd="sng" algn="ctr">
-                      <a:solidFill>
-                        <a:schemeClr val="bg1"/>
-                      </a:solidFill>
-                      <a:prstDash val="solid"/>
-                      <a:round/>
-                      <a:headEnd type="none" w="med" len="med"/>
-                      <a:tailEnd type="none" w="med" len="med"/>
-                    </a:lnL>
-                    <a:lnR w="12700" cap="flat" cmpd="sng" algn="ctr">
-                      <a:solidFill>
-                        <a:schemeClr val="bg1"/>
-                      </a:solidFill>
-                      <a:prstDash val="solid"/>
-                      <a:round/>
-                      <a:headEnd type="none" w="med" len="med"/>
-                      <a:tailEnd type="none" w="med" len="med"/>
-                    </a:lnR>
-                    <a:lnT w="12700" cap="flat" cmpd="sng" algn="ctr">
-                      <a:solidFill>
-                        <a:schemeClr val="bg1"/>
-                      </a:solidFill>
-                      <a:prstDash val="solid"/>
-                      <a:round/>
-                      <a:headEnd type="none" w="med" len="med"/>
-                      <a:tailEnd type="none" w="med" len="med"/>
-                    </a:lnT>
-                    <a:lnB w="12700" cap="flat" cmpd="sng" algn="ctr">
-                      <a:solidFill>
-                        <a:schemeClr val="bg1"/>
-                      </a:solidFill>
-                      <a:prstDash val="solid"/>
-                      <a:round/>
-                      <a:headEnd type="none" w="med" len="med"/>
-                      <a:tailEnd type="none" w="med" len="med"/>
-                    </a:lnB>
-                    <a:lnTlToBr w="12700" cmpd="sng">
-                      <a:noFill/>
-                      <a:prstDash val="solid"/>
-                    </a:lnTlToBr>
-                    <a:lnBlToTr w="12700" cmpd="sng">
-                      <a:noFill/>
-                      <a:prstDash val="solid"/>
-                    </a:lnBlToTr>
-                  </a:tcPr>
-                </a:tc>
-                <a:tc>
-                  <a:txBody>
-                    <a:bodyPr/>
-                    <a:lstStyle/>
-                    <a:p>
-                      <a:pPr algn="ctr" fontAlgn="b"/>
-                      <a:endParaRPr lang="pt-BR" sz="1100" b="0" i="0" u="none" strike="noStrike" dirty="0">
-                        <a:solidFill>
-                          <a:srgbClr val="F94335"/>
-                        </a:solidFill>
-                        <a:latin typeface="Bahnschrift SemiBold SemiConden" panose="020B0502040204020203" pitchFamily="34" charset="0"/>
-                        <a:cs typeface="Arial" pitchFamily="34" charset="0"/>
-                      </a:endParaRPr>
-                    </a:p>
-                  </a:txBody>
-                  <a:tcPr marL="5795" marR="5795" marT="5795" marB="27814" anchor="b">
-                    <a:lnL w="12700" cap="flat" cmpd="sng" algn="ctr">
-                      <a:solidFill>
-                        <a:schemeClr val="bg1"/>
-                      </a:solidFill>
-                      <a:prstDash val="solid"/>
-                      <a:round/>
-                      <a:headEnd type="none" w="med" len="med"/>
-                      <a:tailEnd type="none" w="med" len="med"/>
-                    </a:lnL>
-                    <a:lnR w="12700" cap="flat" cmpd="sng" algn="ctr">
-                      <a:solidFill>
-                        <a:schemeClr val="bg1"/>
-                      </a:solidFill>
-                      <a:prstDash val="solid"/>
-                      <a:round/>
-                      <a:headEnd type="none" w="med" len="med"/>
-                      <a:tailEnd type="none" w="med" len="med"/>
-                    </a:lnR>
-                    <a:lnT w="12700" cap="flat" cmpd="sng" algn="ctr">
-                      <a:solidFill>
-                        <a:schemeClr val="bg1"/>
-                      </a:solidFill>
-                      <a:prstDash val="solid"/>
-                      <a:round/>
-                      <a:headEnd type="none" w="med" len="med"/>
-                      <a:tailEnd type="none" w="med" len="med"/>
-                    </a:lnT>
-                    <a:lnB w="12700" cap="flat" cmpd="sng" algn="ctr">
-                      <a:solidFill>
-                        <a:schemeClr val="bg1"/>
-                      </a:solidFill>
-                      <a:prstDash val="solid"/>
-                      <a:round/>
-                      <a:headEnd type="none" w="med" len="med"/>
-                      <a:tailEnd type="none" w="med" len="med"/>
-                    </a:lnB>
-                    <a:lnTlToBr w="12700" cmpd="sng">
-                      <a:noFill/>
-                      <a:prstDash val="solid"/>
-                    </a:lnTlToBr>
-                    <a:lnBlToTr w="12700" cmpd="sng">
-                      <a:noFill/>
-                      <a:prstDash val="solid"/>
-                    </a:lnBlToTr>
-                  </a:tcPr>
-                </a:tc>
                 <a:extLst>
                   <a:ext uri="{0D108BD9-81ED-4DB2-BD59-A6C34878D82A}">
                     <a16:rowId xmlns:a16="http://schemas.microsoft.com/office/drawing/2014/main" val="10015"/>
@@ -18339,7 +17387,7 @@
         <p:spPr>
           <a:xfrm>
             <a:off x="3601979" y="488020"/>
-            <a:ext cx="4791094" cy="707886"/>
+            <a:ext cx="4791094" cy="646331"/>
           </a:xfrm>
           <a:prstGeom prst="rect">
             <a:avLst/>
@@ -18353,7 +17401,7 @@
           <a:lstStyle/>
           <a:p>
             <a:r>
-              <a:rPr lang="pt-BR" sz="4000" dirty="0" smtClean="0">
+              <a:rPr lang="pt-BR" sz="3600" dirty="0" err="1" smtClean="0">
                 <a:solidFill>
                   <a:srgbClr val="F94335"/>
                 </a:solidFill>
@@ -18367,7 +17415,41 @@
                 <a:latin typeface="Bahnschrift SemiBold SemiConden"/>
                 <a:cs typeface="Arial" pitchFamily="34" charset="0"/>
               </a:rPr>
-              <a:t>PLANILHA</a:t>
+              <a:t>Product</a:t>
+            </a:r>
+            <a:r>
+              <a:rPr lang="pt-BR" sz="3600" dirty="0" smtClean="0">
+                <a:solidFill>
+                  <a:srgbClr val="F94335"/>
+                </a:solidFill>
+                <a:effectLst>
+                  <a:outerShdw blurRad="38100" dist="38100" dir="2700000" algn="tl">
+                    <a:srgbClr val="000000">
+                      <a:alpha val="43137"/>
+                    </a:srgbClr>
+                  </a:outerShdw>
+                </a:effectLst>
+                <a:latin typeface="Bahnschrift SemiBold SemiConden"/>
+                <a:cs typeface="Arial" pitchFamily="34" charset="0"/>
+              </a:rPr>
+              <a:t> </a:t>
+            </a:r>
+            <a:r>
+              <a:rPr lang="pt-BR" sz="3600" dirty="0" err="1" smtClean="0">
+                <a:solidFill>
+                  <a:srgbClr val="F94335"/>
+                </a:solidFill>
+                <a:effectLst>
+                  <a:outerShdw blurRad="38100" dist="38100" dir="2700000" algn="tl">
+                    <a:srgbClr val="000000">
+                      <a:alpha val="43137"/>
+                    </a:srgbClr>
+                  </a:outerShdw>
+                </a:effectLst>
+                <a:latin typeface="Bahnschrift SemiBold SemiConden"/>
+                <a:cs typeface="Arial" pitchFamily="34" charset="0"/>
+              </a:rPr>
+              <a:t>Backlog</a:t>
             </a:r>
             <a:endParaRPr lang="pt-BR" sz="3600" dirty="0">
               <a:solidFill>
@@ -18483,7 +17565,7 @@
                 <a16:creationId xmlns:a16="http://schemas.microsoft.com/office/drawing/2014/main" id="{6AD30037-67ED-4367-9BE0-45787510BF13}"/>
               </a:ext>
               <a:ext uri="{C183D7F6-B498-43B3-948B-1728B52AA6E4}">
-                <adec:decorative xmlns="" xmlns:adec="http://schemas.microsoft.com/office/drawing/2017/decorative" val="1"/>
+                <adec:decorative xmlns:adec="http://schemas.microsoft.com/office/drawing/2017/decorative" xmlns="" val="1"/>
               </a:ext>
             </a:extLst>
           </p:cNvPr>
@@ -18596,7 +17678,7 @@
                 <a16:creationId xmlns:a16="http://schemas.microsoft.com/office/drawing/2014/main" id="{50841A4E-5BC1-44B4-83CF-D524E8AEAD64}"/>
               </a:ext>
               <a:ext uri="{C183D7F6-B498-43B3-948B-1728B52AA6E4}">
-                <adec:decorative xmlns="" xmlns:adec="http://schemas.microsoft.com/office/drawing/2017/decorative" val="1"/>
+                <adec:decorative xmlns:adec="http://schemas.microsoft.com/office/drawing/2017/decorative" xmlns="" val="1"/>
               </a:ext>
             </a:extLst>
           </p:cNvPr>
@@ -18627,7 +17709,7 @@
                   <a16:creationId xmlns:a16="http://schemas.microsoft.com/office/drawing/2014/main" id="{BF371BCC-8954-44E2-8C4F-29DC188727AC}"/>
                 </a:ext>
                 <a:ext uri="{C183D7F6-B498-43B3-948B-1728B52AA6E4}">
-                  <adec:decorative xmlns="" xmlns:adec="http://schemas.microsoft.com/office/drawing/2017/decorative" val="1"/>
+                  <adec:decorative xmlns:adec="http://schemas.microsoft.com/office/drawing/2017/decorative" xmlns="" val="1"/>
                 </a:ext>
               </a:extLst>
             </p:cNvPr>
@@ -18688,7 +17770,7 @@
                   <a16:creationId xmlns:a16="http://schemas.microsoft.com/office/drawing/2014/main" id="{CD3505BE-B420-41C5-BE34-3E7652D37A5F}"/>
                 </a:ext>
                 <a:ext uri="{C183D7F6-B498-43B3-948B-1728B52AA6E4}">
-                  <adec:decorative xmlns="" xmlns:adec="http://schemas.microsoft.com/office/drawing/2017/decorative" val="1"/>
+                  <adec:decorative xmlns:adec="http://schemas.microsoft.com/office/drawing/2017/decorative" xmlns="" val="1"/>
                 </a:ext>
               </a:extLst>
             </p:cNvPr>
@@ -18752,7 +17834,7 @@
                   <a16:creationId xmlns:a16="http://schemas.microsoft.com/office/drawing/2014/main" id="{4B68A05B-A78B-4D59-8CF9-1900731A2188}"/>
                 </a:ext>
                 <a:ext uri="{C183D7F6-B498-43B3-948B-1728B52AA6E4}">
-                  <adec:decorative xmlns="" xmlns:adec="http://schemas.microsoft.com/office/drawing/2017/decorative" val="1"/>
+                  <adec:decorative xmlns:adec="http://schemas.microsoft.com/office/drawing/2017/decorative" xmlns="" val="1"/>
                 </a:ext>
               </a:extLst>
             </p:cNvPr>
@@ -18813,7 +17895,7 @@
                   <a16:creationId xmlns:a16="http://schemas.microsoft.com/office/drawing/2014/main" id="{84D57A01-C112-4FF2-B5ED-0B762AAD9CE2}"/>
                 </a:ext>
                 <a:ext uri="{C183D7F6-B498-43B3-948B-1728B52AA6E4}">
-                  <adec:decorative xmlns="" xmlns:adec="http://schemas.microsoft.com/office/drawing/2017/decorative" val="1"/>
+                  <adec:decorative xmlns:adec="http://schemas.microsoft.com/office/drawing/2017/decorative" xmlns="" val="1"/>
                 </a:ext>
               </a:extLst>
             </p:cNvPr>
@@ -18873,7 +17955,7 @@
                   <a16:creationId xmlns:a16="http://schemas.microsoft.com/office/drawing/2014/main" id="{6CCCCDF1-5D4F-4CA1-8400-DFBB96BB011D}"/>
                 </a:ext>
                 <a:ext uri="{C183D7F6-B498-43B3-948B-1728B52AA6E4}">
-                  <adec:decorative xmlns="" xmlns:adec="http://schemas.microsoft.com/office/drawing/2017/decorative" val="1"/>
+                  <adec:decorative xmlns:adec="http://schemas.microsoft.com/office/drawing/2017/decorative" xmlns="" val="1"/>
                 </a:ext>
               </a:extLst>
             </p:cNvPr>
@@ -18939,7 +18021,7 @@
                   <a16:creationId xmlns:a16="http://schemas.microsoft.com/office/drawing/2014/main" id="{20A090B2-5344-43CD-BC70-A6D44F15E800}"/>
                 </a:ext>
                 <a:ext uri="{C183D7F6-B498-43B3-948B-1728B52AA6E4}">
-                  <adec:decorative xmlns="" xmlns:adec="http://schemas.microsoft.com/office/drawing/2017/decorative" val="1"/>
+                  <adec:decorative xmlns:adec="http://schemas.microsoft.com/office/drawing/2017/decorative" xmlns="" val="1"/>
                 </a:ext>
               </a:extLst>
             </p:cNvPr>
@@ -19314,7 +18396,7 @@
           <a:blip r:embed="rId4">
             <a:extLst>
               <a:ext uri="{96DAC541-7B7A-43D3-8B79-37D633B846F1}">
-                <asvg:svgBlip xmlns="" xmlns:asvg="http://schemas.microsoft.com/office/drawing/2016/SVG/main" r:embed="rId8"/>
+                <asvg:svgBlip xmlns:asvg="http://schemas.microsoft.com/office/drawing/2016/SVG/main" xmlns="" r:embed="rId8"/>
               </a:ext>
             </a:extLst>
           </a:blip>
@@ -19378,7 +18460,7 @@
                 <a16:creationId xmlns:a16="http://schemas.microsoft.com/office/drawing/2014/main" id="{2FCD9B94-D70B-4446-85E5-ACD3904289CB}"/>
               </a:ext>
               <a:ext uri="{C183D7F6-B498-43B3-948B-1728B52AA6E4}">
-                <adec:decorative xmlns="" xmlns:adec="http://schemas.microsoft.com/office/drawing/2017/decorative" val="1"/>
+                <adec:decorative xmlns:adec="http://schemas.microsoft.com/office/drawing/2017/decorative" xmlns="" val="1"/>
               </a:ext>
             </a:extLst>
           </p:cNvPr>
@@ -19656,7 +18738,7 @@
           <a:blip r:embed="rId7">
             <a:extLst>
               <a:ext uri="{96DAC541-7B7A-43D3-8B79-37D633B846F1}">
-                <asvg:svgBlip xmlns="" xmlns:asvg="http://schemas.microsoft.com/office/drawing/2016/SVG/main" r:embed="rId8"/>
+                <asvg:svgBlip xmlns:asvg="http://schemas.microsoft.com/office/drawing/2016/SVG/main" xmlns="" r:embed="rId8"/>
               </a:ext>
             </a:extLst>
           </a:blip>
@@ -20911,7 +19993,7 @@
           <a:blip r:embed="rId2">
             <a:extLst>
               <a:ext uri="{96DAC541-7B7A-43D3-8B79-37D633B846F1}">
-                <asvg:svgBlip xmlns="" xmlns:asvg="http://schemas.microsoft.com/office/drawing/2016/SVG/main" r:embed="rId8"/>
+                <asvg:svgBlip xmlns:asvg="http://schemas.microsoft.com/office/drawing/2016/SVG/main" xmlns="" r:embed="rId8"/>
               </a:ext>
             </a:extLst>
           </a:blip>
@@ -21872,7 +20954,7 @@
           <a:blip r:embed="rId2">
             <a:extLst>
               <a:ext uri="{96DAC541-7B7A-43D3-8B79-37D633B846F1}">
-                <asvg:svgBlip xmlns="" xmlns:asvg="http://schemas.microsoft.com/office/drawing/2016/SVG/main" r:embed="rId8"/>
+                <asvg:svgBlip xmlns:asvg="http://schemas.microsoft.com/office/drawing/2016/SVG/main" xmlns="" r:embed="rId8"/>
               </a:ext>
             </a:extLst>
           </a:blip>
@@ -23312,7 +22394,7 @@
           <a:blip r:embed="rId2">
             <a:extLst>
               <a:ext uri="{96DAC541-7B7A-43D3-8B79-37D633B846F1}">
-                <asvg:svgBlip xmlns="" xmlns:asvg="http://schemas.microsoft.com/office/drawing/2016/SVG/main" r:embed="rId8"/>
+                <asvg:svgBlip xmlns:asvg="http://schemas.microsoft.com/office/drawing/2016/SVG/main" xmlns="" r:embed="rId8"/>
               </a:ext>
             </a:extLst>
           </a:blip>
@@ -24648,7 +23730,7 @@
           <a:blip r:embed="rId2">
             <a:extLst>
               <a:ext uri="{96DAC541-7B7A-43D3-8B79-37D633B846F1}">
-                <asvg:svgBlip xmlns="" xmlns:asvg="http://schemas.microsoft.com/office/drawing/2016/SVG/main" r:embed="rId8"/>
+                <asvg:svgBlip xmlns:asvg="http://schemas.microsoft.com/office/drawing/2016/SVG/main" xmlns="" r:embed="rId8"/>
               </a:ext>
             </a:extLst>
           </a:blip>
@@ -25833,7 +24915,7 @@
           <a:blip r:embed="rId2">
             <a:extLst>
               <a:ext uri="{96DAC541-7B7A-43D3-8B79-37D633B846F1}">
-                <asvg:svgBlip xmlns="" xmlns:asvg="http://schemas.microsoft.com/office/drawing/2016/SVG/main" r:embed="rId8"/>
+                <asvg:svgBlip xmlns:asvg="http://schemas.microsoft.com/office/drawing/2016/SVG/main" xmlns="" r:embed="rId8"/>
               </a:ext>
             </a:extLst>
           </a:blip>
@@ -26311,7 +25393,7 @@
         <p:spPr>
           <a:xfrm>
             <a:off x="554180" y="803561"/>
-            <a:ext cx="3131129" cy="2677656"/>
+            <a:ext cx="2327565" cy="2031325"/>
           </a:xfrm>
           <a:prstGeom prst="rect">
             <a:avLst/>
@@ -26358,29 +25440,21 @@
           <a:p>
             <a:pPr algn="ctr"/>
             <a:r>
-              <a:rPr lang="pt-BR" sz="2400" dirty="0" smtClean="0"/>
+              <a:rPr lang="pt-BR" dirty="0" smtClean="0"/>
               <a:t>Eu enquanto usuário,  quero  saber a situação da unidade de saúde, pois preciso me planejar</a:t>
             </a:r>
           </a:p>
           <a:p>
             <a:pPr algn="ctr"/>
             <a:r>
-              <a:rPr lang="pt-BR" sz="2400" dirty="0"/>
+              <a:rPr lang="pt-BR" dirty="0"/>
               <a:t>p</a:t>
             </a:r>
             <a:r>
-              <a:rPr lang="pt-BR" sz="2400" dirty="0" smtClean="0"/>
-              <a:t>ara </a:t>
+              <a:rPr lang="pt-BR" dirty="0" smtClean="0"/>
+              <a:t>ara me dirigir ao hospital mais viável</a:t>
             </a:r>
-            <a:r>
-              <a:rPr lang="pt-BR" sz="2400" dirty="0" smtClean="0"/>
-              <a:t>me dirigir ao hospital mais </a:t>
-            </a:r>
-            <a:r>
-              <a:rPr lang="pt-BR" sz="2400" dirty="0" smtClean="0"/>
-              <a:t>viável</a:t>
-            </a:r>
-            <a:endParaRPr lang="pt-BR" sz="2400" dirty="0"/>
+            <a:endParaRPr lang="pt-BR" dirty="0"/>
           </a:p>
         </p:txBody>
       </p:sp>
@@ -26392,7 +25466,7 @@
         </p:nvSpPr>
         <p:spPr>
           <a:xfrm>
-            <a:off x="1028361" y="0"/>
+            <a:off x="936137" y="-115921"/>
             <a:ext cx="9710126" cy="769441"/>
           </a:xfrm>
           <a:prstGeom prst="rect">
@@ -26441,7 +25515,7 @@
           <a:blip r:embed="rId2">
             <a:extLst>
               <a:ext uri="{96DAC541-7B7A-43D3-8B79-37D633B846F1}">
-                <asvg:svgBlip xmlns="" xmlns:asvg="http://schemas.microsoft.com/office/drawing/2016/SVG/main" r:embed="rId8"/>
+                <asvg:svgBlip xmlns:asvg="http://schemas.microsoft.com/office/drawing/2016/SVG/main" xmlns="" r:embed="rId8"/>
               </a:ext>
             </a:extLst>
           </a:blip>
@@ -26451,7 +25525,7 @@
         </p:blipFill>
         <p:spPr>
           <a:xfrm>
-            <a:off x="80000" y="5970317"/>
+            <a:off x="11243639" y="-84122"/>
             <a:ext cx="948361" cy="887683"/>
           </a:xfrm>
           <a:prstGeom prst="rect">
@@ -26467,8 +25541,8 @@
         </p:nvSpPr>
         <p:spPr>
           <a:xfrm>
-            <a:off x="4391889" y="911283"/>
-            <a:ext cx="3131129" cy="2569934"/>
+            <a:off x="3103413" y="803561"/>
+            <a:ext cx="2479968" cy="2031325"/>
           </a:xfrm>
           <a:prstGeom prst="rect">
             <a:avLst/>
@@ -26515,38 +25589,18 @@
           <a:p>
             <a:pPr algn="ctr"/>
             <a:r>
-              <a:rPr lang="pt-BR" sz="2300" dirty="0" smtClean="0"/>
+              <a:rPr lang="pt-BR" dirty="0" smtClean="0"/>
               <a:t>Eu enquanto </a:t>
             </a:r>
             <a:r>
-              <a:rPr lang="pt-BR" sz="2300" dirty="0"/>
+              <a:rPr lang="pt-BR" dirty="0"/>
               <a:t> </a:t>
             </a:r>
             <a:r>
-              <a:rPr lang="pt-BR" sz="2300" dirty="0" smtClean="0"/>
-              <a:t>médico</a:t>
+              <a:rPr lang="pt-BR" dirty="0" smtClean="0"/>
+              <a:t>médico,  quero  ter controle  sobre dados de meus paciente, pois preciso do controle e o entendimento de quem estou prestando serviço</a:t>
             </a:r>
-            <a:r>
-              <a:rPr lang="pt-BR" sz="2300" dirty="0" smtClean="0"/>
-              <a:t>,  </a:t>
-            </a:r>
-            <a:r>
-              <a:rPr lang="pt-BR" sz="2300" dirty="0" smtClean="0"/>
-              <a:t>quero  </a:t>
-            </a:r>
-            <a:r>
-              <a:rPr lang="pt-BR" sz="2300" dirty="0" smtClean="0"/>
-              <a:t>ter controle  sobre dados de meus paciente, </a:t>
-            </a:r>
-            <a:r>
-              <a:rPr lang="pt-BR" sz="2300" dirty="0" smtClean="0"/>
-              <a:t>pois </a:t>
-            </a:r>
-            <a:r>
-              <a:rPr lang="pt-BR" sz="2300" dirty="0" smtClean="0"/>
-              <a:t>preciso do controle e o entendimento de quem estou prestando serviço</a:t>
-            </a:r>
-            <a:endParaRPr lang="pt-BR" sz="2300" dirty="0"/>
+            <a:endParaRPr lang="pt-BR" dirty="0"/>
           </a:p>
         </p:txBody>
       </p:sp>
@@ -26558,8 +25612,8 @@
         </p:nvSpPr>
         <p:spPr>
           <a:xfrm>
-            <a:off x="8229599" y="857422"/>
-            <a:ext cx="3131129" cy="2569934"/>
+            <a:off x="5805049" y="803561"/>
+            <a:ext cx="2784765" cy="2031325"/>
           </a:xfrm>
           <a:prstGeom prst="rect">
             <a:avLst/>
@@ -26606,34 +25660,10 @@
           <a:p>
             <a:pPr algn="ctr"/>
             <a:r>
-              <a:rPr lang="pt-BR" sz="2300" dirty="0" smtClean="0"/>
-              <a:t>Eu enquanto </a:t>
+              <a:rPr lang="pt-BR" dirty="0" smtClean="0"/>
+              <a:t>Eu enquanto gerente,  quero  ter uma estrutura bem definida de dados , pois de uma modelagem bem definida para que não ocorra anomalia na aplicação</a:t>
             </a:r>
-            <a:r>
-              <a:rPr lang="pt-BR" sz="2300" dirty="0" smtClean="0"/>
-              <a:t>gerente,  </a:t>
-            </a:r>
-            <a:r>
-              <a:rPr lang="pt-BR" sz="2300" dirty="0" smtClean="0"/>
-              <a:t>quero  </a:t>
-            </a:r>
-            <a:r>
-              <a:rPr lang="pt-BR" sz="2300" dirty="0" smtClean="0"/>
-              <a:t>ter uma estrutura bem definida de dados </a:t>
-            </a:r>
-            <a:r>
-              <a:rPr lang="pt-BR" sz="2300" dirty="0" smtClean="0"/>
-              <a:t>, pois de uma modelagem bem definida </a:t>
-            </a:r>
-            <a:r>
-              <a:rPr lang="pt-BR" sz="2300" dirty="0" smtClean="0"/>
-              <a:t>p</a:t>
-            </a:r>
-            <a:r>
-              <a:rPr lang="pt-BR" sz="2300" dirty="0" smtClean="0"/>
-              <a:t>ara que não ocorra anomalia na aplicação</a:t>
-            </a:r>
-            <a:endParaRPr lang="pt-BR" sz="2300" dirty="0"/>
+            <a:endParaRPr lang="pt-BR" dirty="0"/>
           </a:p>
         </p:txBody>
       </p:sp>
@@ -26645,8 +25675,8 @@
         </p:nvSpPr>
         <p:spPr>
           <a:xfrm>
-            <a:off x="2078179" y="3904410"/>
-            <a:ext cx="3131129" cy="2677656"/>
+            <a:off x="8811482" y="803561"/>
+            <a:ext cx="2590809" cy="2031325"/>
           </a:xfrm>
           <a:prstGeom prst="rect">
             <a:avLst/>
@@ -26693,34 +25723,17 @@
           <a:p>
             <a:pPr algn="ctr"/>
             <a:r>
-              <a:rPr lang="pt-BR" sz="2400" dirty="0" smtClean="0"/>
-              <a:t>Eu enquanto </a:t>
+              <a:rPr lang="pt-BR" dirty="0" smtClean="0"/>
+              <a:t>Eu enquanto usuário, quero uma interface fácil e intuitiva, para manuseio correto das ferramentas</a:t>
             </a:r>
-            <a:r>
-              <a:rPr lang="pt-BR" sz="2400" dirty="0" smtClean="0"/>
-              <a:t>usuário, quero</a:t>
-            </a:r>
-            <a:r>
-              <a:rPr lang="pt-BR" sz="2400" dirty="0" smtClean="0"/>
-              <a:t> uma interface fácil e intuitiva</a:t>
-            </a:r>
-            <a:r>
-              <a:rPr lang="pt-BR" sz="2400" dirty="0" smtClean="0"/>
-              <a:t>, para manuseio correto das ferramentas</a:t>
-            </a:r>
-            <a:endParaRPr lang="pt-BR" sz="2400" dirty="0" smtClean="0"/>
           </a:p>
           <a:p>
             <a:pPr algn="ctr"/>
             <a:r>
-              <a:rPr lang="pt-BR" sz="2400" dirty="0" smtClean="0"/>
-              <a:t>P</a:t>
+              <a:rPr lang="pt-BR" dirty="0" smtClean="0"/>
+              <a:t>Para agilizar processos de consultas médicas</a:t>
             </a:r>
-            <a:r>
-              <a:rPr lang="pt-BR" sz="2400" dirty="0" smtClean="0"/>
-              <a:t>ara agilizar processos de consultas médicas</a:t>
-            </a:r>
-            <a:endParaRPr lang="pt-BR" sz="2400" dirty="0"/>
+            <a:endParaRPr lang="pt-BR" dirty="0"/>
           </a:p>
         </p:txBody>
       </p:sp>
@@ -26732,8 +25745,8 @@
         </p:nvSpPr>
         <p:spPr>
           <a:xfrm>
-            <a:off x="6442360" y="3904410"/>
-            <a:ext cx="3131129" cy="2677656"/>
+            <a:off x="554180" y="3532909"/>
+            <a:ext cx="2327565" cy="2585323"/>
           </a:xfrm>
           <a:prstGeom prst="rect">
             <a:avLst/>
@@ -26780,34 +25793,10 @@
           <a:p>
             <a:pPr algn="ctr"/>
             <a:r>
-              <a:rPr lang="pt-BR" sz="2100" dirty="0" smtClean="0"/>
-              <a:t>Eu enquanto </a:t>
+              <a:rPr lang="pt-BR" dirty="0" smtClean="0"/>
+              <a:t>Eu enquanto administrado,  quero o recebimento de dados dos pacientes, pois preciso gerenciar a unidade de saúde para ter o controle e a administração correta do local</a:t>
             </a:r>
-            <a:r>
-              <a:rPr lang="pt-BR" sz="2100" dirty="0" smtClean="0"/>
-              <a:t>administrado</a:t>
-            </a:r>
-            <a:r>
-              <a:rPr lang="pt-BR" sz="2100" dirty="0" smtClean="0"/>
-              <a:t>,  quero o recebimento de dados dos pacientes, </a:t>
-            </a:r>
-            <a:r>
-              <a:rPr lang="pt-BR" sz="2100" dirty="0" smtClean="0"/>
-              <a:t>pois </a:t>
-            </a:r>
-            <a:r>
-              <a:rPr lang="pt-BR" sz="2100" dirty="0" smtClean="0"/>
-              <a:t>preciso gerenciar a unidade </a:t>
-            </a:r>
-            <a:r>
-              <a:rPr lang="pt-BR" sz="2100" dirty="0" smtClean="0"/>
-              <a:t>de saúde p</a:t>
-            </a:r>
-            <a:r>
-              <a:rPr lang="pt-BR" sz="2100" dirty="0" smtClean="0"/>
-              <a:t>ara ter o controle e a administração correta do local</a:t>
-            </a:r>
-            <a:endParaRPr lang="pt-BR" sz="2100" dirty="0"/>
+            <a:endParaRPr lang="pt-BR" dirty="0"/>
           </a:p>
         </p:txBody>
       </p:sp>

</xml_diff>